<commit_message>
First draft of poster
</commit_message>
<xml_diff>
--- a/poster/poster-version2.pptx
+++ b/poster/poster-version2.pptx
@@ -304,7 +304,7 @@
           <a:p>
             <a:fld id="{9A230909-950A-47DB-9D57-C917A0047A48}" type="datetimeFigureOut">
               <a:rPr lang="en-GB" smtClean="0"/>
-              <a:t>06/11/2019</a:t>
+              <a:t>07/11/2019</a:t>
             </a:fld>
             <a:endParaRPr lang="en-GB"/>
           </a:p>
@@ -474,7 +474,7 @@
           <a:p>
             <a:fld id="{9A230909-950A-47DB-9D57-C917A0047A48}" type="datetimeFigureOut">
               <a:rPr lang="en-GB" smtClean="0"/>
-              <a:t>06/11/2019</a:t>
+              <a:t>07/11/2019</a:t>
             </a:fld>
             <a:endParaRPr lang="en-GB"/>
           </a:p>
@@ -654,7 +654,7 @@
           <a:p>
             <a:fld id="{9A230909-950A-47DB-9D57-C917A0047A48}" type="datetimeFigureOut">
               <a:rPr lang="en-GB" smtClean="0"/>
-              <a:t>06/11/2019</a:t>
+              <a:t>07/11/2019</a:t>
             </a:fld>
             <a:endParaRPr lang="en-GB"/>
           </a:p>
@@ -824,7 +824,7 @@
           <a:p>
             <a:fld id="{9A230909-950A-47DB-9D57-C917A0047A48}" type="datetimeFigureOut">
               <a:rPr lang="en-GB" smtClean="0"/>
-              <a:t>06/11/2019</a:t>
+              <a:t>07/11/2019</a:t>
             </a:fld>
             <a:endParaRPr lang="en-GB"/>
           </a:p>
@@ -1070,7 +1070,7 @@
           <a:p>
             <a:fld id="{9A230909-950A-47DB-9D57-C917A0047A48}" type="datetimeFigureOut">
               <a:rPr lang="en-GB" smtClean="0"/>
-              <a:t>06/11/2019</a:t>
+              <a:t>07/11/2019</a:t>
             </a:fld>
             <a:endParaRPr lang="en-GB"/>
           </a:p>
@@ -1358,7 +1358,7 @@
           <a:p>
             <a:fld id="{9A230909-950A-47DB-9D57-C917A0047A48}" type="datetimeFigureOut">
               <a:rPr lang="en-GB" smtClean="0"/>
-              <a:t>06/11/2019</a:t>
+              <a:t>07/11/2019</a:t>
             </a:fld>
             <a:endParaRPr lang="en-GB"/>
           </a:p>
@@ -1785,7 +1785,7 @@
           <a:p>
             <a:fld id="{9A230909-950A-47DB-9D57-C917A0047A48}" type="datetimeFigureOut">
               <a:rPr lang="en-GB" smtClean="0"/>
-              <a:t>06/11/2019</a:t>
+              <a:t>07/11/2019</a:t>
             </a:fld>
             <a:endParaRPr lang="en-GB"/>
           </a:p>
@@ -1903,7 +1903,7 @@
           <a:p>
             <a:fld id="{9A230909-950A-47DB-9D57-C917A0047A48}" type="datetimeFigureOut">
               <a:rPr lang="en-GB" smtClean="0"/>
-              <a:t>06/11/2019</a:t>
+              <a:t>07/11/2019</a:t>
             </a:fld>
             <a:endParaRPr lang="en-GB"/>
           </a:p>
@@ -1998,7 +1998,7 @@
           <a:p>
             <a:fld id="{9A230909-950A-47DB-9D57-C917A0047A48}" type="datetimeFigureOut">
               <a:rPr lang="en-GB" smtClean="0"/>
-              <a:t>06/11/2019</a:t>
+              <a:t>07/11/2019</a:t>
             </a:fld>
             <a:endParaRPr lang="en-GB"/>
           </a:p>
@@ -2275,7 +2275,7 @@
           <a:p>
             <a:fld id="{9A230909-950A-47DB-9D57-C917A0047A48}" type="datetimeFigureOut">
               <a:rPr lang="en-GB" smtClean="0"/>
-              <a:t>06/11/2019</a:t>
+              <a:t>07/11/2019</a:t>
             </a:fld>
             <a:endParaRPr lang="en-GB"/>
           </a:p>
@@ -2528,7 +2528,7 @@
           <a:p>
             <a:fld id="{9A230909-950A-47DB-9D57-C917A0047A48}" type="datetimeFigureOut">
               <a:rPr lang="en-GB" smtClean="0"/>
-              <a:t>06/11/2019</a:t>
+              <a:t>07/11/2019</a:t>
             </a:fld>
             <a:endParaRPr lang="en-GB"/>
           </a:p>
@@ -2765,7 +2765,7 @@
           <a:p>
             <a:fld id="{9A230909-950A-47DB-9D57-C917A0047A48}" type="datetimeFigureOut">
               <a:rPr lang="en-GB" smtClean="0"/>
-              <a:t>06/11/2019</a:t>
+              <a:t>07/11/2019</a:t>
             </a:fld>
             <a:endParaRPr lang="en-GB"/>
           </a:p>
@@ -3197,7 +3197,7 @@
         </p:blipFill>
         <p:spPr>
           <a:xfrm>
-            <a:off x="9117741" y="10657756"/>
+            <a:off x="9351869" y="10657756"/>
             <a:ext cx="11476750" cy="5565815"/>
           </a:xfrm>
           <a:prstGeom prst="rect">
@@ -3207,257 +3207,6 @@
             <a:solidFill>
               <a:schemeClr val="tx1"/>
             </a:solidFill>
-          </a:ln>
-          <a:effectLst>
-            <a:outerShdw blurRad="190500" algn="tl" rotWithShape="0">
-              <a:srgbClr val="000000">
-                <a:alpha val="70000"/>
-              </a:srgbClr>
-            </a:outerShdw>
-          </a:effectLst>
-        </p:spPr>
-      </p:pic>
-      <p:sp>
-        <p:nvSpPr>
-          <p:cNvPr id="14" name="Rounded Rectangle 13"/>
-          <p:cNvSpPr/>
-          <p:nvPr/>
-        </p:nvSpPr>
-        <p:spPr>
-          <a:xfrm>
-            <a:off x="21230461" y="13566018"/>
-            <a:ext cx="8784976" cy="4228307"/>
-          </a:xfrm>
-          <a:prstGeom prst="rect">
-            <a:avLst/>
-          </a:prstGeom>
-          <a:noFill/>
-          <a:ln w="50800">
-            <a:solidFill>
-              <a:schemeClr val="tx1"/>
-            </a:solidFill>
-          </a:ln>
-        </p:spPr>
-        <p:style>
-          <a:lnRef idx="2">
-            <a:schemeClr val="accent1">
-              <a:shade val="50000"/>
-            </a:schemeClr>
-          </a:lnRef>
-          <a:fillRef idx="1">
-            <a:schemeClr val="accent1"/>
-          </a:fillRef>
-          <a:effectRef idx="0">
-            <a:schemeClr val="accent1"/>
-          </a:effectRef>
-          <a:fontRef idx="minor">
-            <a:schemeClr val="lt1"/>
-          </a:fontRef>
-        </p:style>
-        <p:txBody>
-          <a:bodyPr rtlCol="0" anchor="t"/>
-          <a:lstStyle/>
-          <a:p>
-            <a:pPr algn="ctr"/>
-            <a:r>
-              <a:rPr lang="en-GB" sz="4000" dirty="0">
-                <a:solidFill>
-                  <a:schemeClr val="tx1"/>
-                </a:solidFill>
-              </a:rPr>
-              <a:t>Conclusions &amp; Future Work</a:t>
-            </a:r>
-          </a:p>
-          <a:p>
-            <a:pPr algn="just"/>
-            <a:r>
-              <a:rPr lang="en-GB" sz="2000" dirty="0">
-                <a:solidFill>
-                  <a:schemeClr val="tx1"/>
-                </a:solidFill>
-              </a:rPr>
-              <a:t>The new method was compared to existing approaches for model extraction, and was found to offer drastically simpler models, with statistically equivalent test accuracy. To our best knowledge, this is the first utilisation of multi-objective optimisation in explainable AI. We also believe this is the first application of GP for model extraction, and shows a promising direction for future developments.</a:t>
-            </a:r>
-          </a:p>
-          <a:p>
-            <a:pPr algn="just"/>
-            <a:endParaRPr lang="en-GB" sz="2000" dirty="0">
-              <a:solidFill>
-                <a:schemeClr val="tx1"/>
-              </a:solidFill>
-            </a:endParaRPr>
-          </a:p>
-          <a:p>
-            <a:pPr algn="just"/>
-            <a:r>
-              <a:rPr lang="en-GB" sz="2000" dirty="0">
-                <a:solidFill>
-                  <a:schemeClr val="tx1"/>
-                </a:solidFill>
-              </a:rPr>
-              <a:t>Three focus areas for future work:</a:t>
-            </a:r>
-          </a:p>
-          <a:p>
-            <a:pPr marL="342900" indent="-342900" algn="just">
-              <a:buFont typeface="Arial" panose="020B0604020202020204" pitchFamily="34" charset="0"/>
-              <a:buChar char="•"/>
-            </a:pPr>
-            <a:r>
-              <a:rPr lang="en-GB" sz="2000" dirty="0">
-                <a:solidFill>
-                  <a:schemeClr val="tx1"/>
-                </a:solidFill>
-              </a:rPr>
-              <a:t>Can recreation ability be improved without sacrificing simplicity? </a:t>
-            </a:r>
-          </a:p>
-          <a:p>
-            <a:pPr marL="342900" indent="-342900" algn="just">
-              <a:buFont typeface="Arial" panose="020B0604020202020204" pitchFamily="34" charset="0"/>
-              <a:buChar char="•"/>
-            </a:pPr>
-            <a:r>
-              <a:rPr lang="en-GB" sz="2000" dirty="0">
-                <a:solidFill>
-                  <a:schemeClr val="tx1"/>
-                </a:solidFill>
-              </a:rPr>
-              <a:t>Can we find a more suitable measure of complexity to describe human interpretability?  </a:t>
-            </a:r>
-          </a:p>
-          <a:p>
-            <a:pPr marL="342900" indent="-342900" algn="just">
-              <a:buFont typeface="Arial" panose="020B0604020202020204" pitchFamily="34" charset="0"/>
-              <a:buChar char="•"/>
-            </a:pPr>
-            <a:r>
-              <a:rPr lang="en-GB" sz="2000" dirty="0">
-                <a:solidFill>
-                  <a:schemeClr val="tx1"/>
-                </a:solidFill>
-              </a:rPr>
-              <a:t>Is it possible to guide the evolution of the models based on human feedback?</a:t>
-            </a:r>
-          </a:p>
-        </p:txBody>
-      </p:sp>
-      <p:pic>
-        <p:nvPicPr>
-          <p:cNvPr id="6" name="Picture 5"/>
-          <p:cNvPicPr>
-            <a:picLocks noChangeAspect="1"/>
-          </p:cNvPicPr>
-          <p:nvPr/>
-        </p:nvPicPr>
-        <p:blipFill>
-          <a:blip r:embed="rId4">
-            <a:extLst>
-              <a:ext uri="{28A0092B-C50C-407E-A947-70E740481C1C}">
-                <a14:useLocalDpi xmlns:a14="http://schemas.microsoft.com/office/drawing/2010/main" val="0"/>
-              </a:ext>
-            </a:extLst>
-          </a:blip>
-          <a:stretch>
-            <a:fillRect/>
-          </a:stretch>
-        </p:blipFill>
-        <p:spPr>
-          <a:xfrm>
-            <a:off x="4167119" y="17298568"/>
-            <a:ext cx="4699987" cy="3592537"/>
-          </a:xfrm>
-          <a:prstGeom prst="rect">
-            <a:avLst/>
-          </a:prstGeom>
-          <a:ln>
-            <a:noFill/>
-          </a:ln>
-          <a:effectLst>
-            <a:outerShdw blurRad="190500" algn="tl" rotWithShape="0">
-              <a:srgbClr val="000000">
-                <a:alpha val="70000"/>
-              </a:srgbClr>
-            </a:outerShdw>
-          </a:effectLst>
-        </p:spPr>
-      </p:pic>
-      <p:pic>
-        <p:nvPicPr>
-          <p:cNvPr id="10" name="Picture 9"/>
-          <p:cNvPicPr>
-            <a:picLocks noChangeAspect="1"/>
-          </p:cNvPicPr>
-          <p:nvPr/>
-        </p:nvPicPr>
-        <p:blipFill>
-          <a:blip r:embed="rId5" cstate="print">
-            <a:extLst>
-              <a:ext uri="{28A0092B-C50C-407E-A947-70E740481C1C}">
-                <a14:useLocalDpi xmlns:a14="http://schemas.microsoft.com/office/drawing/2010/main" val="0"/>
-              </a:ext>
-            </a:extLst>
-          </a:blip>
-          <a:stretch>
-            <a:fillRect/>
-          </a:stretch>
-        </p:blipFill>
-        <p:spPr>
-          <a:xfrm>
-            <a:off x="334728" y="17447682"/>
-            <a:ext cx="3583643" cy="2030694"/>
-          </a:xfrm>
-          <a:prstGeom prst="rect">
-            <a:avLst/>
-          </a:prstGeom>
-          <a:ln>
-            <a:noFill/>
-          </a:ln>
-          <a:effectLst>
-            <a:outerShdw blurRad="190500" algn="tl" rotWithShape="0">
-              <a:srgbClr val="000000">
-                <a:alpha val="70000"/>
-              </a:srgbClr>
-            </a:outerShdw>
-          </a:effectLst>
-        </p:spPr>
-      </p:pic>
-      <p:pic>
-        <p:nvPicPr>
-          <p:cNvPr id="45" name="Picture 44">
-            <a:extLst>
-              <a:ext uri="{FF2B5EF4-FFF2-40B4-BE49-F238E27FC236}">
-                <a16:creationId xmlns:a16="http://schemas.microsoft.com/office/drawing/2014/main" id="{6526A47A-CB1A-40C8-B2E9-C7143A7AA3A1}"/>
-              </a:ext>
-            </a:extLst>
-          </p:cNvPr>
-          <p:cNvPicPr>
-            <a:picLocks noChangeAspect="1"/>
-          </p:cNvPicPr>
-          <p:nvPr/>
-        </p:nvPicPr>
-        <p:blipFill>
-          <a:blip r:embed="rId6" cstate="print">
-            <a:extLst>
-              <a:ext uri="{28A0092B-C50C-407E-A947-70E740481C1C}">
-                <a14:useLocalDpi xmlns:a14="http://schemas.microsoft.com/office/drawing/2010/main" val="0"/>
-              </a:ext>
-            </a:extLst>
-          </a:blip>
-          <a:stretch>
-            <a:fillRect/>
-          </a:stretch>
-        </p:blipFill>
-        <p:spPr>
-          <a:xfrm>
-            <a:off x="31052164" y="9800013"/>
-            <a:ext cx="14165114" cy="7835803"/>
-          </a:xfrm>
-          <a:prstGeom prst="rect">
-            <a:avLst/>
-          </a:prstGeom>
-          <a:ln>
-            <a:noFill/>
           </a:ln>
           <a:effectLst>
             <a:outerShdw blurRad="190500" algn="tl" rotWithShape="0">
@@ -3483,13 +3232,13 @@
           <p:nvPr>
             <p:extLst>
               <p:ext uri="{D42A27DB-BD31-4B8C-83A1-F6EECF244321}">
-                <p14:modId xmlns:p14="http://schemas.microsoft.com/office/powerpoint/2010/main" val="746463716"/>
+                <p14:modId xmlns:p14="http://schemas.microsoft.com/office/powerpoint/2010/main" val="1883467947"/>
               </p:ext>
             </p:extLst>
           </p:nvPr>
         </p:nvGraphicFramePr>
         <p:xfrm>
-          <a:off x="8890759" y="5139670"/>
+          <a:off x="9163323" y="4788744"/>
           <a:ext cx="6249228" cy="3017520"/>
         </p:xfrm>
         <a:graphic>
@@ -3773,8 +3522,8 @@
         </p:nvSpPr>
         <p:spPr>
           <a:xfrm>
-            <a:off x="9000295" y="7787244"/>
-            <a:ext cx="5903323" cy="2554545"/>
+            <a:off x="9236664" y="7569761"/>
+            <a:ext cx="5903323" cy="1323439"/>
           </a:xfrm>
           <a:prstGeom prst="rect">
             <a:avLst/>
@@ -3792,76 +3541,7 @@
               <a:rPr lang="en-GB" sz="2000" dirty="0">
                 <a:cs typeface="Arial" panose="020B0604020202020204" pitchFamily="34" charset="0"/>
               </a:rPr>
-              <a:t>A broad range of 30 datasets from the OpenML repository [7] were used for comparison. These were the 20 most run binary datasets, and 10 most run multiclass datasets. The datasets were restricted to less than 15000 instances, less than 5 classes, and no missing values. These datasets are from a variety of domains, and have a varying number of features (both categorical and numeric), classes, and instances.</a:t>
-            </a:r>
-          </a:p>
-        </p:txBody>
-      </p:sp>
-      <p:sp>
-        <p:nvSpPr>
-          <p:cNvPr id="54" name="Rounded Rectangle 13">
-            <a:extLst>
-              <a:ext uri="{FF2B5EF4-FFF2-40B4-BE49-F238E27FC236}">
-                <a16:creationId xmlns:a16="http://schemas.microsoft.com/office/drawing/2014/main" id="{29F75D6C-A8A1-41D1-8003-5B0C6BA508FD}"/>
-              </a:ext>
-            </a:extLst>
-          </p:cNvPr>
-          <p:cNvSpPr/>
-          <p:nvPr/>
-        </p:nvSpPr>
-        <p:spPr>
-          <a:xfrm>
-            <a:off x="21230460" y="18103584"/>
-            <a:ext cx="8784976" cy="3041086"/>
-          </a:xfrm>
-          <a:prstGeom prst="rect">
-            <a:avLst/>
-          </a:prstGeom>
-          <a:noFill/>
-          <a:ln w="50800">
-            <a:solidFill>
-              <a:schemeClr val="tx1"/>
-            </a:solidFill>
-          </a:ln>
-        </p:spPr>
-        <p:style>
-          <a:lnRef idx="2">
-            <a:schemeClr val="accent1">
-              <a:shade val="50000"/>
-            </a:schemeClr>
-          </a:lnRef>
-          <a:fillRef idx="1">
-            <a:schemeClr val="accent1"/>
-          </a:fillRef>
-          <a:effectRef idx="0">
-            <a:schemeClr val="accent1"/>
-          </a:effectRef>
-          <a:fontRef idx="minor">
-            <a:schemeClr val="lt1"/>
-          </a:fontRef>
-        </p:style>
-        <p:txBody>
-          <a:bodyPr rtlCol="0" anchor="t"/>
-          <a:lstStyle/>
-          <a:p>
-            <a:pPr algn="ctr"/>
-            <a:r>
-              <a:rPr lang="en-GB" sz="4000" dirty="0">
-                <a:solidFill>
-                  <a:schemeClr val="tx1"/>
-                </a:solidFill>
-              </a:rPr>
-              <a:t>References</a:t>
-            </a:r>
-          </a:p>
-          <a:p>
-            <a:r>
-              <a:rPr lang="en-GB" sz="2000" dirty="0">
-                <a:solidFill>
-                  <a:schemeClr val="tx1"/>
-                </a:solidFill>
-              </a:rPr>
-              <a:t>REFERENCES GO HERE - TODO</a:t>
+              <a:t>A broad range of 30 datasets from the OpenML repository [7] were used for comparison. The datasets were restricted to less than 15000 instances, less than 5 classes, and no missing values. </a:t>
             </a:r>
           </a:p>
         </p:txBody>
@@ -3875,7 +3555,7 @@
           <p:nvPr/>
         </p:nvPicPr>
         <p:blipFill>
-          <a:blip r:embed="rId7">
+          <a:blip r:embed="rId4">
             <a:extLst>
               <a:ext uri="{28A0092B-C50C-407E-A947-70E740481C1C}">
                 <a14:useLocalDpi xmlns:a14="http://schemas.microsoft.com/office/drawing/2010/main" val="0"/>
@@ -3888,7 +3568,7 @@
         </p:blipFill>
         <p:spPr>
           <a:xfrm>
-            <a:off x="15376358" y="5383636"/>
+            <a:off x="15551110" y="5220792"/>
             <a:ext cx="5205501" cy="4848144"/>
           </a:xfrm>
           <a:prstGeom prst="rect">
@@ -4134,7 +3814,7 @@
           <p:nvPr/>
         </p:nvPicPr>
         <p:blipFill>
-          <a:blip r:embed="rId8">
+          <a:blip r:embed="rId5">
             <a:extLst>
               <a:ext uri="{28A0092B-C50C-407E-A947-70E740481C1C}">
                 <a14:useLocalDpi xmlns:a14="http://schemas.microsoft.com/office/drawing/2010/main" val="0"/>
@@ -4169,7 +3849,7 @@
         </p:nvGrpSpPr>
         <p:grpSpPr>
           <a:xfrm>
-            <a:off x="9020083" y="16751609"/>
+            <a:off x="9226902" y="16751609"/>
             <a:ext cx="11313685" cy="3729920"/>
             <a:chOff x="7481073" y="16636001"/>
             <a:chExt cx="11313685" cy="3729920"/>
@@ -4184,7 +3864,7 @@
             <p:nvPr/>
           </p:nvPicPr>
           <p:blipFill>
-            <a:blip r:embed="rId9" cstate="print">
+            <a:blip r:embed="rId6" cstate="print">
               <a:extLst>
                 <a:ext uri="{28A0092B-C50C-407E-A947-70E740481C1C}">
                   <a14:useLocalDpi xmlns:a14="http://schemas.microsoft.com/office/drawing/2010/main" val="0"/>
@@ -4230,7 +3910,7 @@
             <p:nvPr/>
           </p:nvPicPr>
           <p:blipFill>
-            <a:blip r:embed="rId10">
+            <a:blip r:embed="rId7">
               <a:extLst>
                 <a:ext uri="{28A0092B-C50C-407E-A947-70E740481C1C}">
                   <a14:useLocalDpi xmlns:a14="http://schemas.microsoft.com/office/drawing/2010/main" val="0"/>
@@ -4276,7 +3956,7 @@
             <p:nvPr/>
           </p:nvPicPr>
           <p:blipFill>
-            <a:blip r:embed="rId11" cstate="print">
+            <a:blip r:embed="rId8" cstate="print">
               <a:extLst>
                 <a:ext uri="{28A0092B-C50C-407E-A947-70E740481C1C}">
                   <a14:useLocalDpi xmlns:a14="http://schemas.microsoft.com/office/drawing/2010/main" val="0"/>
@@ -4499,86 +4179,12 @@
         </p:nvGrpSpPr>
         <p:grpSpPr>
           <a:xfrm>
-            <a:off x="21230460" y="3711664"/>
-            <a:ext cx="8784976" cy="9545095"/>
-            <a:chOff x="21327182" y="3596577"/>
-            <a:chExt cx="8784976" cy="9545095"/>
+            <a:off x="21835758" y="4495900"/>
+            <a:ext cx="7719569" cy="8334774"/>
+            <a:chOff x="21932480" y="4380813"/>
+            <a:chExt cx="7719569" cy="8334774"/>
           </a:xfrm>
         </p:grpSpPr>
-        <p:sp>
-          <p:nvSpPr>
-            <p:cNvPr id="32" name="Rounded Rectangle 12">
-              <a:extLst>
-                <a:ext uri="{FF2B5EF4-FFF2-40B4-BE49-F238E27FC236}">
-                  <a16:creationId xmlns:a16="http://schemas.microsoft.com/office/drawing/2014/main" id="{6BB5D9B5-837D-4ED6-A04E-97EEC64DEF68}"/>
-                </a:ext>
-              </a:extLst>
-            </p:cNvPr>
-            <p:cNvSpPr/>
-            <p:nvPr/>
-          </p:nvSpPr>
-          <p:spPr>
-            <a:xfrm>
-              <a:off x="21327182" y="3596577"/>
-              <a:ext cx="8784976" cy="9545095"/>
-            </a:xfrm>
-            <a:prstGeom prst="rect">
-              <a:avLst/>
-            </a:prstGeom>
-            <a:noFill/>
-            <a:ln w="50800">
-              <a:solidFill>
-                <a:schemeClr val="tx1"/>
-              </a:solidFill>
-            </a:ln>
-          </p:spPr>
-          <p:style>
-            <a:lnRef idx="2">
-              <a:schemeClr val="accent1">
-                <a:shade val="50000"/>
-              </a:schemeClr>
-            </a:lnRef>
-            <a:fillRef idx="1">
-              <a:schemeClr val="accent1"/>
-            </a:fillRef>
-            <a:effectRef idx="0">
-              <a:schemeClr val="accent1"/>
-            </a:effectRef>
-            <a:fontRef idx="minor">
-              <a:schemeClr val="lt1"/>
-            </a:fontRef>
-          </p:style>
-          <p:txBody>
-            <a:bodyPr rtlCol="0" anchor="t"/>
-            <a:lstStyle/>
-            <a:p>
-              <a:pPr algn="ctr"/>
-              <a:r>
-                <a:rPr lang="en-GB" sz="4000" dirty="0">
-                  <a:solidFill>
-                    <a:schemeClr val="tx1"/>
-                  </a:solidFill>
-                </a:rPr>
-                <a:t>Further Analysis (Hill-Valley Dataset)</a:t>
-              </a:r>
-            </a:p>
-            <a:p>
-              <a:pPr algn="just"/>
-              <a:endParaRPr lang="en-GB" sz="2000" dirty="0">
-                <a:solidFill>
-                  <a:schemeClr val="tx1"/>
-                </a:solidFill>
-              </a:endParaRPr>
-            </a:p>
-            <a:p>
-              <a:endParaRPr lang="en-GB" sz="2000" dirty="0">
-                <a:solidFill>
-                  <a:schemeClr val="tx1"/>
-                </a:solidFill>
-              </a:endParaRPr>
-            </a:p>
-          </p:txBody>
-        </p:sp>
         <p:grpSp>
           <p:nvGrpSpPr>
             <p:cNvPr id="19" name="Group 18">
@@ -4614,7 +4220,7 @@
               <p:nvPr/>
             </p:nvPicPr>
             <p:blipFill>
-              <a:blip r:embed="rId12">
+              <a:blip r:embed="rId9">
                 <a:extLst>
                   <a:ext uri="{28A0092B-C50C-407E-A947-70E740481C1C}">
                     <a14:useLocalDpi xmlns:a14="http://schemas.microsoft.com/office/drawing/2010/main" val="0"/>
@@ -4739,7 +4345,7 @@
               <a:pPr algn="just"/>
               <a:r>
                 <a:rPr lang="en-GB" sz="2000" dirty="0"/>
-                <a:t>Looking into our evolved tree we can see its splitting points make sense when considering the hill-valley dataset, which "when plotted in order the Y coordinate will create either a Hill or a Valley [13]. We can see the tree is checking the first point, and comparing to the point at 30\% (i.e. the 30th feature), or the point at 70\%, where the tree is trying to distinguish between classes by finding the common points for the hills/valleys and checking if these are high or low relative to the training data (e.g. a high point at the start, a low point at 30\%, then a high point at 57\% indicates a valley based on this tree).</a:t>
+                <a:t>Looking into our evolved tree we can see its splitting points make sense when considering the hill-valley dataset, which "when plotted in order the Y coordinate will create either a Hill or a Valley [13]. We can see the tree is checking the first point, and comparing to the point at 30\%, or the point at 70\%, where the tree is trying to distinguish between classes by finding the common points for the hills/valleys and checking if these are high or low relative to the training data (e.g. a high point at the start, a low point at 30\%, then a high point at 57\% indicates a valley based on this tree).</a:t>
               </a:r>
             </a:p>
             <a:p>
@@ -4762,8 +4368,8 @@
         </p:nvSpPr>
         <p:spPr>
           <a:xfrm>
-            <a:off x="30523103" y="6376547"/>
-            <a:ext cx="6710151" cy="2862322"/>
+            <a:off x="21836927" y="13258076"/>
+            <a:ext cx="7718400" cy="2763916"/>
           </a:xfrm>
           <a:prstGeom prst="rect">
             <a:avLst/>
@@ -4772,7 +4378,7 @@
         </p:spPr>
         <p:txBody>
           <a:bodyPr wrap="square" rtlCol="0">
-            <a:spAutoFit/>
+            <a:noAutofit/>
           </a:bodyPr>
           <a:lstStyle/>
           <a:p>
@@ -4783,25 +4389,21 @@
             </a:r>
           </a:p>
           <a:p>
-            <a:pPr marL="342900" indent="-342900" algn="just">
+            <a:pPr algn="just"/>
+            <a:endParaRPr lang="en-GB" sz="2000" dirty="0"/>
+          </a:p>
+          <a:p>
+            <a:pPr marL="342900" indent="-342900">
               <a:buFont typeface="Arial" panose="020B0604020202020204" pitchFamily="34" charset="0"/>
               <a:buChar char="•"/>
             </a:pPr>
             <a:r>
               <a:rPr lang="en-GB" sz="2000" dirty="0"/>
-              <a:t>Autonuniv-Au7-500 and GesturePhase datasets have 5 classes. Relax push for simple trees on </a:t>
-            </a:r>
-            <a:r>
-              <a:rPr lang="en-GB" sz="2000" dirty="0" err="1"/>
-              <a:t>datastes</a:t>
-            </a:r>
-            <a:r>
-              <a:rPr lang="en-GB" sz="2000" dirty="0"/>
-              <a:t> with many classes.</a:t>
-            </a:r>
-          </a:p>
-          <a:p>
-            <a:pPr marL="342900" indent="-342900" algn="just">
+              <a:t>Autonuniv-Au7-500 and GesturePhase datasets have 5 classes. Perhaps relax push for simple trees on datasets with many classes.</a:t>
+            </a:r>
+          </a:p>
+          <a:p>
+            <a:pPr marL="342900" indent="-342900">
               <a:buFont typeface="Arial" panose="020B0604020202020204" pitchFamily="34" charset="0"/>
               <a:buChar char="•"/>
             </a:pPr>
@@ -4811,7 +4413,7 @@
             </a:r>
           </a:p>
           <a:p>
-            <a:pPr marL="342900" indent="-342900" algn="just">
+            <a:pPr marL="342900" indent="-342900">
               <a:buFont typeface="Arial" panose="020B0604020202020204" pitchFamily="34" charset="0"/>
               <a:buChar char="•"/>
             </a:pPr>
@@ -4847,7 +4449,7 @@
         </p:nvSpPr>
         <p:spPr>
           <a:xfrm>
-            <a:off x="12090424" y="3986865"/>
+            <a:off x="12295480" y="3708624"/>
             <a:ext cx="6012859" cy="830997"/>
           </a:xfrm>
           <a:prstGeom prst="rect">
@@ -4882,8 +4484,8 @@
         </p:nvSpPr>
         <p:spPr>
           <a:xfrm>
-            <a:off x="264538" y="12471929"/>
-            <a:ext cx="8369700" cy="1569660"/>
+            <a:off x="634068" y="8749184"/>
+            <a:ext cx="7718400" cy="2404823"/>
           </a:xfrm>
           <a:prstGeom prst="rect">
             <a:avLst/>
@@ -4892,15 +4494,19 @@
         </p:spPr>
         <p:txBody>
           <a:bodyPr wrap="square" rtlCol="0">
-            <a:spAutoFit/>
+            <a:noAutofit/>
           </a:bodyPr>
           <a:lstStyle/>
           <a:p>
             <a:pPr algn="just"/>
             <a:r>
               <a:rPr lang="en-GB" sz="2400" dirty="0"/>
-              <a:t>We propose a novel model agnostic approach to XAI model extraction. We use NSGA-II paired with strongly typed GP (STGP) to evolve decision tree-like structures which simultaneously balance the complexity and accuracy of the trees.</a:t>
-            </a:r>
+              <a:t>We propose a novel model agnostic approach to XAI model extraction. We use NSGA-II paired with strongly typed GP (STGP) to evolve decision tree-like structures which simultaneously balance the complexity and accuracy of the trees. Complexity is minimised and accuracy maximised by our objective functions below. </a:t>
+            </a:r>
+          </a:p>
+          <a:p>
+            <a:pPr algn="just"/>
+            <a:endParaRPr lang="en-GB" sz="2400" dirty="0"/>
           </a:p>
         </p:txBody>
       </p:sp>
@@ -4918,7 +4524,7 @@
         </p:nvSpPr>
         <p:spPr>
           <a:xfrm>
-            <a:off x="2317931" y="11710039"/>
+            <a:off x="2423120" y="8029104"/>
             <a:ext cx="4152742" cy="769441"/>
           </a:xfrm>
           <a:prstGeom prst="rect">
@@ -4939,522 +4545,1021 @@
           </a:p>
         </p:txBody>
       </p:sp>
-      <mc:AlternateContent xmlns:mc="http://schemas.openxmlformats.org/markup-compatibility/2006">
-        <mc:Choice xmlns:a14="http://schemas.microsoft.com/office/drawing/2010/main" Requires="a14">
-          <p:sp>
-            <p:nvSpPr>
-              <p:cNvPr id="27" name="TextBox 26">
+      <p:cxnSp>
+        <p:nvCxnSpPr>
+          <p:cNvPr id="37" name="Straight Connector 36">
+            <a:extLst>
+              <a:ext uri="{FF2B5EF4-FFF2-40B4-BE49-F238E27FC236}">
+                <a16:creationId xmlns:a16="http://schemas.microsoft.com/office/drawing/2014/main" id="{41F36828-6B33-48D0-B8C9-0D9CCC8494FF}"/>
+              </a:ext>
+            </a:extLst>
+          </p:cNvPr>
+          <p:cNvCxnSpPr>
+            <a:cxnSpLocks/>
+          </p:cNvCxnSpPr>
+          <p:nvPr/>
+        </p:nvCxnSpPr>
+        <p:spPr>
+          <a:xfrm>
+            <a:off x="21332675" y="3529521"/>
+            <a:ext cx="0" cy="17361584"/>
+          </a:xfrm>
+          <a:prstGeom prst="line">
+            <a:avLst/>
+          </a:prstGeom>
+          <a:ln w="127000">
+            <a:solidFill>
+              <a:schemeClr val="tx1"/>
+            </a:solidFill>
+          </a:ln>
+        </p:spPr>
+        <p:style>
+          <a:lnRef idx="1">
+            <a:schemeClr val="accent1"/>
+          </a:lnRef>
+          <a:fillRef idx="0">
+            <a:schemeClr val="accent1"/>
+          </a:fillRef>
+          <a:effectRef idx="0">
+            <a:schemeClr val="accent1"/>
+          </a:effectRef>
+          <a:fontRef idx="minor">
+            <a:schemeClr val="tx1"/>
+          </a:fontRef>
+        </p:style>
+      </p:cxnSp>
+      <p:cxnSp>
+        <p:nvCxnSpPr>
+          <p:cNvPr id="39" name="Straight Connector 38">
+            <a:extLst>
+              <a:ext uri="{FF2B5EF4-FFF2-40B4-BE49-F238E27FC236}">
+                <a16:creationId xmlns:a16="http://schemas.microsoft.com/office/drawing/2014/main" id="{F31C3F9F-7E07-400A-8C41-62E3853F8547}"/>
+              </a:ext>
+            </a:extLst>
+          </p:cNvPr>
+          <p:cNvCxnSpPr>
+            <a:cxnSpLocks/>
+          </p:cNvCxnSpPr>
+          <p:nvPr/>
+        </p:nvCxnSpPr>
+        <p:spPr>
+          <a:xfrm>
+            <a:off x="8803283" y="3529521"/>
+            <a:ext cx="0" cy="17361584"/>
+          </a:xfrm>
+          <a:prstGeom prst="line">
+            <a:avLst/>
+          </a:prstGeom>
+          <a:ln w="127000">
+            <a:solidFill>
+              <a:schemeClr val="tx1"/>
+            </a:solidFill>
+          </a:ln>
+        </p:spPr>
+        <p:style>
+          <a:lnRef idx="1">
+            <a:schemeClr val="accent1"/>
+          </a:lnRef>
+          <a:fillRef idx="0">
+            <a:schemeClr val="accent1"/>
+          </a:fillRef>
+          <a:effectRef idx="0">
+            <a:schemeClr val="accent1"/>
+          </a:effectRef>
+          <a:fontRef idx="minor">
+            <a:schemeClr val="tx1"/>
+          </a:fontRef>
+        </p:style>
+      </p:cxnSp>
+      <p:sp>
+        <p:nvSpPr>
+          <p:cNvPr id="13" name="TextBox 12">
+            <a:extLst>
+              <a:ext uri="{FF2B5EF4-FFF2-40B4-BE49-F238E27FC236}">
+                <a16:creationId xmlns:a16="http://schemas.microsoft.com/office/drawing/2014/main" id="{4CB12018-CB45-4E76-BF69-DC072BFB0F6A}"/>
+              </a:ext>
+            </a:extLst>
+          </p:cNvPr>
+          <p:cNvSpPr txBox="1"/>
+          <p:nvPr/>
+        </p:nvSpPr>
+        <p:spPr>
+          <a:xfrm>
+            <a:off x="21813931" y="16787741"/>
+            <a:ext cx="7704000" cy="4004161"/>
+          </a:xfrm>
+          <a:prstGeom prst="rect">
+            <a:avLst/>
+          </a:prstGeom>
+          <a:noFill/>
+        </p:spPr>
+        <p:txBody>
+          <a:bodyPr wrap="square" rtlCol="0">
+            <a:noAutofit/>
+          </a:bodyPr>
+          <a:lstStyle/>
+          <a:p>
+            <a:pPr algn="just"/>
+            <a:r>
+              <a:rPr lang="en-GB" sz="2000" dirty="0"/>
+              <a:t>The new method was compared to existing approaches for model extraction, and was found to offer drastically simpler models, with statistically equivalent test accuracy. To our best knowledge, this is the first utilisation of multi-objective optimisation in explainable AI. We also believe this is the first application of GP for model extraction, and shows a promising direction for future developments.</a:t>
+            </a:r>
+          </a:p>
+          <a:p>
+            <a:pPr algn="just"/>
+            <a:endParaRPr lang="en-GB" sz="2000" dirty="0"/>
+          </a:p>
+          <a:p>
+            <a:pPr algn="just"/>
+            <a:r>
+              <a:rPr lang="en-GB" sz="2000" dirty="0"/>
+              <a:t>Three focus areas for future work:</a:t>
+            </a:r>
+          </a:p>
+          <a:p>
+            <a:pPr marL="342900" indent="-342900" algn="just">
+              <a:buFont typeface="Arial" panose="020B0604020202020204" pitchFamily="34" charset="0"/>
+              <a:buChar char="•"/>
+            </a:pPr>
+            <a:r>
+              <a:rPr lang="en-GB" sz="2000" dirty="0"/>
+              <a:t>Can recreation ability be improved without sacrificing simplicity? </a:t>
+            </a:r>
+          </a:p>
+          <a:p>
+            <a:pPr marL="342900" indent="-342900" algn="just">
+              <a:buFont typeface="Arial" panose="020B0604020202020204" pitchFamily="34" charset="0"/>
+              <a:buChar char="•"/>
+            </a:pPr>
+            <a:r>
+              <a:rPr lang="en-GB" sz="2000" dirty="0"/>
+              <a:t>Can we find a more suitable measure of complexity to describe human interpretability?  </a:t>
+            </a:r>
+          </a:p>
+          <a:p>
+            <a:pPr marL="342900" indent="-342900" algn="just">
+              <a:buFont typeface="Arial" panose="020B0604020202020204" pitchFamily="34" charset="0"/>
+              <a:buChar char="•"/>
+            </a:pPr>
+            <a:r>
+              <a:rPr lang="en-GB" sz="2000" dirty="0"/>
+              <a:t>Is it possible to guide the evolution of the models based on human feedback?</a:t>
+            </a:r>
+          </a:p>
+          <a:p>
+            <a:endParaRPr lang="en-GB" sz="2000" dirty="0"/>
+          </a:p>
+        </p:txBody>
+      </p:sp>
+      <p:sp>
+        <p:nvSpPr>
+          <p:cNvPr id="25" name="TextBox 24">
+            <a:extLst>
+              <a:ext uri="{FF2B5EF4-FFF2-40B4-BE49-F238E27FC236}">
+                <a16:creationId xmlns:a16="http://schemas.microsoft.com/office/drawing/2014/main" id="{5A961CB8-D9BB-43E8-AA4C-030CE5CC5E83}"/>
+              </a:ext>
+            </a:extLst>
+          </p:cNvPr>
+          <p:cNvSpPr txBox="1"/>
+          <p:nvPr/>
+        </p:nvSpPr>
+        <p:spPr>
+          <a:xfrm>
+            <a:off x="22488866" y="16021992"/>
+            <a:ext cx="6354129" cy="769441"/>
+          </a:xfrm>
+          <a:prstGeom prst="rect">
+            <a:avLst/>
+          </a:prstGeom>
+          <a:noFill/>
+        </p:spPr>
+        <p:txBody>
+          <a:bodyPr wrap="square" rtlCol="0">
+            <a:spAutoFit/>
+          </a:bodyPr>
+          <a:lstStyle/>
+          <a:p>
+            <a:r>
+              <a:rPr lang="en-GB" sz="4400" dirty="0"/>
+              <a:t>Conclusion &amp; Future Work</a:t>
+            </a:r>
+          </a:p>
+        </p:txBody>
+      </p:sp>
+      <p:sp>
+        <p:nvSpPr>
+          <p:cNvPr id="28" name="TextBox 27">
+            <a:extLst>
+              <a:ext uri="{FF2B5EF4-FFF2-40B4-BE49-F238E27FC236}">
+                <a16:creationId xmlns:a16="http://schemas.microsoft.com/office/drawing/2014/main" id="{F161C641-936D-4EC1-821E-B6406AD2FA10}"/>
+              </a:ext>
+            </a:extLst>
+          </p:cNvPr>
+          <p:cNvSpPr txBox="1"/>
+          <p:nvPr/>
+        </p:nvSpPr>
+        <p:spPr>
+          <a:xfrm>
+            <a:off x="23727048" y="3753943"/>
+            <a:ext cx="4639487" cy="769441"/>
+          </a:xfrm>
+          <a:prstGeom prst="rect">
+            <a:avLst/>
+          </a:prstGeom>
+          <a:noFill/>
+        </p:spPr>
+        <p:txBody>
+          <a:bodyPr wrap="square" rtlCol="0">
+            <a:spAutoFit/>
+          </a:bodyPr>
+          <a:lstStyle/>
+          <a:p>
+            <a:r>
+              <a:rPr lang="en-GB" sz="4400" dirty="0"/>
+              <a:t>Further Analysis</a:t>
+            </a:r>
+          </a:p>
+        </p:txBody>
+      </p:sp>
+      <p:grpSp>
+        <p:nvGrpSpPr>
+          <p:cNvPr id="38" name="Group 37">
+            <a:extLst>
+              <a:ext uri="{FF2B5EF4-FFF2-40B4-BE49-F238E27FC236}">
+                <a16:creationId xmlns:a16="http://schemas.microsoft.com/office/drawing/2014/main" id="{89D48EB8-C025-45D1-A868-9F9691F60AF4}"/>
+              </a:ext>
+            </a:extLst>
+          </p:cNvPr>
+          <p:cNvGrpSpPr/>
+          <p:nvPr/>
+        </p:nvGrpSpPr>
+        <p:grpSpPr>
+          <a:xfrm>
+            <a:off x="1365515" y="15669347"/>
+            <a:ext cx="6325177" cy="4097061"/>
+            <a:chOff x="1365515" y="16841893"/>
+            <a:chExt cx="6325177" cy="4097061"/>
+          </a:xfrm>
+        </p:grpSpPr>
+        <p:grpSp>
+          <p:nvGrpSpPr>
+            <p:cNvPr id="5" name="Group 4">
+              <a:extLst>
+                <a:ext uri="{FF2B5EF4-FFF2-40B4-BE49-F238E27FC236}">
+                  <a16:creationId xmlns:a16="http://schemas.microsoft.com/office/drawing/2014/main" id="{DAA3E9FC-1EE3-4D42-9FB4-83425C8D64E6}"/>
+                </a:ext>
+              </a:extLst>
+            </p:cNvPr>
+            <p:cNvGrpSpPr/>
+            <p:nvPr/>
+          </p:nvGrpSpPr>
+          <p:grpSpPr>
+            <a:xfrm>
+              <a:off x="1365515" y="16841893"/>
+              <a:ext cx="6325177" cy="4097061"/>
+              <a:chOff x="738094" y="16751609"/>
+              <a:chExt cx="6325177" cy="4097061"/>
+            </a:xfrm>
+          </p:grpSpPr>
+          <p:pic>
+            <p:nvPicPr>
+              <p:cNvPr id="6" name="Picture 5"/>
+              <p:cNvPicPr>
+                <a:picLocks noChangeAspect="1"/>
+              </p:cNvPicPr>
+              <p:nvPr/>
+            </p:nvPicPr>
+            <p:blipFill>
+              <a:blip r:embed="rId10">
                 <a:extLst>
-                  <a:ext uri="{FF2B5EF4-FFF2-40B4-BE49-F238E27FC236}">
-                    <a16:creationId xmlns:a16="http://schemas.microsoft.com/office/drawing/2014/main" id="{C3C5D9DB-291A-406A-941D-203402A8590E}"/>
+                  <a:ext uri="{28A0092B-C50C-407E-A947-70E740481C1C}">
+                    <a14:useLocalDpi xmlns:a14="http://schemas.microsoft.com/office/drawing/2010/main" val="0"/>
                   </a:ext>
                 </a:extLst>
-              </p:cNvPr>
-              <p:cNvSpPr txBox="1"/>
-              <p:nvPr/>
-            </p:nvSpPr>
+              </a:blip>
+              <a:stretch>
+                <a:fillRect/>
+              </a:stretch>
+            </p:blipFill>
             <p:spPr>
               <a:xfrm>
-                <a:off x="989754" y="15961316"/>
-                <a:ext cx="7309116" cy="1043363"/>
+                <a:off x="2363284" y="16751609"/>
+                <a:ext cx="4699987" cy="3592537"/>
               </a:xfrm>
               <a:prstGeom prst="rect">
                 <a:avLst/>
               </a:prstGeom>
-              <a:noFill/>
+              <a:ln>
+                <a:noFill/>
+              </a:ln>
+              <a:effectLst>
+                <a:outerShdw blurRad="190500" algn="tl" rotWithShape="0">
+                  <a:srgbClr val="000000">
+                    <a:alpha val="70000"/>
+                  </a:srgbClr>
+                </a:outerShdw>
+              </a:effectLst>
             </p:spPr>
-            <p:txBody>
-              <a:bodyPr wrap="square" lIns="0" tIns="0" rIns="0" bIns="0" rtlCol="0">
-                <a:spAutoFit/>
-              </a:bodyPr>
-              <a:lstStyle/>
-              <a:p>
-                <a14:m>
-                  <m:oMathPara xmlns:m="http://schemas.openxmlformats.org/officeDocument/2006/math">
-                    <m:oMathParaPr>
-                      <m:jc m:val="centerGroup"/>
-                    </m:oMathParaPr>
-                    <m:oMath xmlns:m="http://schemas.openxmlformats.org/officeDocument/2006/math">
-                      <m:r>
-                        <a:rPr lang="en-GB" sz="2800" b="0" i="1" smtClean="0">
-                          <a:latin typeface="Cambria Math" panose="02040503050406030204" pitchFamily="18" charset="0"/>
-                        </a:rPr>
-                        <m:t>𝑚𝑖𝑛𝑖𝑚𝑖𝑠𝑒</m:t>
-                      </m:r>
-                      <m:nary>
-                        <m:naryPr>
-                          <m:chr m:val="∑"/>
-                          <m:subHide m:val="on"/>
-                          <m:supHide m:val="on"/>
-                          <m:ctrlPr>
-                            <a:rPr lang="en-GB" sz="2800" b="0" i="1" smtClean="0">
-                              <a:latin typeface="Cambria Math" panose="02040503050406030204" pitchFamily="18" charset="0"/>
-                            </a:rPr>
-                          </m:ctrlPr>
-                        </m:naryPr>
-                        <m:sub/>
-                        <m:sup/>
-                        <m:e>
-                          <m:r>
-                            <a:rPr lang="en-GB" sz="2800" b="0" i="1" smtClean="0">
-                              <a:latin typeface="Cambria Math" panose="02040503050406030204" pitchFamily="18" charset="0"/>
-                            </a:rPr>
-                            <m:t>𝑠𝑝𝑙𝑖𝑡</m:t>
-                          </m:r>
-                          <m:r>
-                            <a:rPr lang="en-GB" sz="2800" b="0" i="1" smtClean="0">
-                              <a:latin typeface="Cambria Math" panose="02040503050406030204" pitchFamily="18" charset="0"/>
-                            </a:rPr>
-                            <m:t>_</m:t>
-                          </m:r>
-                          <m:r>
-                            <a:rPr lang="en-GB" sz="2800" b="0" i="1" smtClean="0">
-                              <a:latin typeface="Cambria Math" panose="02040503050406030204" pitchFamily="18" charset="0"/>
-                            </a:rPr>
-                            <m:t>𝑝𝑜𝑖𝑛𝑡𝑠</m:t>
-                          </m:r>
-                        </m:e>
-                      </m:nary>
-                    </m:oMath>
-                  </m:oMathPara>
-                </a14:m>
-                <a:endParaRPr lang="en-GB" sz="2800" dirty="0"/>
-              </a:p>
-            </p:txBody>
-          </p:sp>
-        </mc:Choice>
-        <mc:Fallback>
-          <p:sp>
-            <p:nvSpPr>
-              <p:cNvPr id="27" name="TextBox 26">
+          </p:pic>
+          <p:pic>
+            <p:nvPicPr>
+              <p:cNvPr id="10" name="Picture 9"/>
+              <p:cNvPicPr>
+                <a:picLocks noChangeAspect="1"/>
+              </p:cNvPicPr>
+              <p:nvPr/>
+            </p:nvPicPr>
+            <p:blipFill>
+              <a:blip r:embed="rId11" cstate="print">
                 <a:extLst>
-                  <a:ext uri="{FF2B5EF4-FFF2-40B4-BE49-F238E27FC236}">
-                    <a16:creationId xmlns:a16="http://schemas.microsoft.com/office/drawing/2014/main" id="{C3C5D9DB-291A-406A-941D-203402A8590E}"/>
+                  <a:ext uri="{28A0092B-C50C-407E-A947-70E740481C1C}">
+                    <a14:useLocalDpi xmlns:a14="http://schemas.microsoft.com/office/drawing/2010/main" val="0"/>
                   </a:ext>
                 </a:extLst>
-              </p:cNvPr>
-              <p:cNvSpPr txBox="1">
-                <a:spLocks noRot="1" noChangeAspect="1" noMove="1" noResize="1" noEditPoints="1" noAdjustHandles="1" noChangeArrowheads="1" noChangeShapeType="1" noTextEdit="1"/>
-              </p:cNvSpPr>
-              <p:nvPr/>
-            </p:nvSpPr>
+              </a:blip>
+              <a:stretch>
+                <a:fillRect/>
+              </a:stretch>
+            </p:blipFill>
             <p:spPr>
               <a:xfrm>
-                <a:off x="989754" y="15961316"/>
-                <a:ext cx="7309116" cy="1043363"/>
+                <a:off x="738094" y="18817976"/>
+                <a:ext cx="3583643" cy="2030694"/>
               </a:xfrm>
               <a:prstGeom prst="rect">
                 <a:avLst/>
               </a:prstGeom>
-              <a:blipFill>
-                <a:blip r:embed="rId13"/>
-                <a:stretch>
-                  <a:fillRect/>
-                </a:stretch>
-              </a:blipFill>
+              <a:ln>
+                <a:noFill/>
+              </a:ln>
+              <a:effectLst>
+                <a:outerShdw blurRad="190500" algn="tl" rotWithShape="0">
+                  <a:srgbClr val="000000">
+                    <a:alpha val="70000"/>
+                  </a:srgbClr>
+                </a:outerShdw>
+              </a:effectLst>
             </p:spPr>
-            <p:txBody>
-              <a:bodyPr/>
-              <a:lstStyle/>
-              <a:p>
-                <a:r>
-                  <a:rPr lang="en-GB">
-                    <a:noFill/>
-                  </a:rPr>
-                  <a:t> </a:t>
-                </a:r>
-              </a:p>
-            </p:txBody>
-          </p:sp>
-        </mc:Fallback>
-      </mc:AlternateContent>
-      <mc:AlternateContent xmlns:mc="http://schemas.openxmlformats.org/markup-compatibility/2006">
-        <mc:Choice xmlns:a14="http://schemas.microsoft.com/office/drawing/2010/main" Requires="a14">
-          <p:sp>
-            <p:nvSpPr>
-              <p:cNvPr id="29" name="TextBox 28">
-                <a:extLst>
-                  <a:ext uri="{FF2B5EF4-FFF2-40B4-BE49-F238E27FC236}">
-                    <a16:creationId xmlns:a16="http://schemas.microsoft.com/office/drawing/2014/main" id="{F34BC0A3-5C58-4D1E-AB58-06E2A1D7B69B}"/>
-                  </a:ext>
-                </a:extLst>
-              </p:cNvPr>
-              <p:cNvSpPr txBox="1"/>
-              <p:nvPr/>
-            </p:nvSpPr>
-            <p:spPr>
-              <a:xfrm>
-                <a:off x="89776" y="14070709"/>
-                <a:ext cx="8933279" cy="1045927"/>
-              </a:xfrm>
-              <a:prstGeom prst="rect">
-                <a:avLst/>
-              </a:prstGeom>
-              <a:noFill/>
-            </p:spPr>
-            <p:txBody>
-              <a:bodyPr wrap="square" lIns="0" tIns="0" rIns="0" bIns="0" rtlCol="0">
-                <a:spAutoFit/>
-              </a:bodyPr>
-              <a:lstStyle/>
-              <a:p>
-                <a14:m>
-                  <m:oMathPara xmlns:m="http://schemas.openxmlformats.org/officeDocument/2006/math">
-                    <m:oMathParaPr>
-                      <m:jc m:val="centerGroup"/>
-                    </m:oMathParaPr>
-                    <m:oMath xmlns:m="http://schemas.openxmlformats.org/officeDocument/2006/math">
-                      <m:r>
-                        <a:rPr lang="en-GB" sz="2400" b="0" i="1" smtClean="0">
-                          <a:latin typeface="Cambria Math" panose="02040503050406030204" pitchFamily="18" charset="0"/>
-                        </a:rPr>
-                        <m:t>𝑚𝑎𝑥𝑖𝑚𝑖𝑠𝑒</m:t>
-                      </m:r>
-                      <m:f>
-                        <m:fPr>
-                          <m:ctrlPr>
-                            <a:rPr lang="en-GB" sz="2400" b="0" i="1" smtClean="0">
+          </p:pic>
+        </p:grpSp>
+        <p:cxnSp>
+          <p:nvCxnSpPr>
+            <p:cNvPr id="35" name="Straight Arrow Connector 34">
+              <a:extLst>
+                <a:ext uri="{FF2B5EF4-FFF2-40B4-BE49-F238E27FC236}">
+                  <a16:creationId xmlns:a16="http://schemas.microsoft.com/office/drawing/2014/main" id="{BD5494EA-A04D-4E4A-8152-19A0E4256222}"/>
+                </a:ext>
+              </a:extLst>
+            </p:cNvPr>
+            <p:cNvCxnSpPr>
+              <a:cxnSpLocks/>
+            </p:cNvCxnSpPr>
+            <p:nvPr/>
+          </p:nvCxnSpPr>
+          <p:spPr>
+            <a:xfrm flipH="1">
+              <a:off x="2990705" y="18657407"/>
+              <a:ext cx="2587973" cy="437430"/>
+            </a:xfrm>
+            <a:prstGeom prst="straightConnector1">
+              <a:avLst/>
+            </a:prstGeom>
+            <a:ln w="63500">
+              <a:solidFill>
+                <a:schemeClr val="tx1"/>
+              </a:solidFill>
+              <a:tailEnd type="triangle"/>
+            </a:ln>
+          </p:spPr>
+          <p:style>
+            <a:lnRef idx="1">
+              <a:schemeClr val="accent1"/>
+            </a:lnRef>
+            <a:fillRef idx="0">
+              <a:schemeClr val="accent1"/>
+            </a:fillRef>
+            <a:effectRef idx="0">
+              <a:schemeClr val="accent1"/>
+            </a:effectRef>
+            <a:fontRef idx="minor">
+              <a:schemeClr val="tx1"/>
+            </a:fontRef>
+          </p:style>
+        </p:cxnSp>
+      </p:grpSp>
+      <p:sp>
+        <p:nvSpPr>
+          <p:cNvPr id="42" name="TextBox 41">
+            <a:extLst>
+              <a:ext uri="{FF2B5EF4-FFF2-40B4-BE49-F238E27FC236}">
+                <a16:creationId xmlns:a16="http://schemas.microsoft.com/office/drawing/2014/main" id="{C358187D-65FB-4CE4-8774-C1B970BA7745}"/>
+              </a:ext>
+            </a:extLst>
+          </p:cNvPr>
+          <p:cNvSpPr txBox="1"/>
+          <p:nvPr/>
+        </p:nvSpPr>
+        <p:spPr>
+          <a:xfrm>
+            <a:off x="593263" y="20021690"/>
+            <a:ext cx="7718400" cy="824838"/>
+          </a:xfrm>
+          <a:prstGeom prst="rect">
+            <a:avLst/>
+          </a:prstGeom>
+          <a:noFill/>
+        </p:spPr>
+        <p:txBody>
+          <a:bodyPr wrap="square" rtlCol="0">
+            <a:noAutofit/>
+          </a:bodyPr>
+          <a:lstStyle/>
+          <a:p>
+            <a:r>
+              <a:rPr lang="en-GB" sz="2400" dirty="0"/>
+              <a:t>Evolutionary training process of our algorithm shown above alongside diagram of non-dominated sorting in NSGA-II.</a:t>
+            </a:r>
+          </a:p>
+        </p:txBody>
+      </p:sp>
+      <p:sp>
+        <p:nvSpPr>
+          <p:cNvPr id="43" name="TextBox 42">
+            <a:extLst>
+              <a:ext uri="{FF2B5EF4-FFF2-40B4-BE49-F238E27FC236}">
+                <a16:creationId xmlns:a16="http://schemas.microsoft.com/office/drawing/2014/main" id="{E85481DA-2C0F-45A3-BFA0-4215A1F7A989}"/>
+              </a:ext>
+            </a:extLst>
+          </p:cNvPr>
+          <p:cNvSpPr txBox="1"/>
+          <p:nvPr/>
+        </p:nvSpPr>
+        <p:spPr>
+          <a:xfrm>
+            <a:off x="2863135" y="3522703"/>
+            <a:ext cx="3187278" cy="769441"/>
+          </a:xfrm>
+          <a:prstGeom prst="rect">
+            <a:avLst/>
+          </a:prstGeom>
+          <a:noFill/>
+        </p:spPr>
+        <p:txBody>
+          <a:bodyPr wrap="square" rtlCol="0">
+            <a:spAutoFit/>
+          </a:bodyPr>
+          <a:lstStyle/>
+          <a:p>
+            <a:r>
+              <a:rPr lang="en-GB" sz="4400" dirty="0"/>
+              <a:t>Introduction</a:t>
+            </a:r>
+          </a:p>
+        </p:txBody>
+      </p:sp>
+      <p:sp>
+        <p:nvSpPr>
+          <p:cNvPr id="44" name="TextBox 43">
+            <a:extLst>
+              <a:ext uri="{FF2B5EF4-FFF2-40B4-BE49-F238E27FC236}">
+                <a16:creationId xmlns:a16="http://schemas.microsoft.com/office/drawing/2014/main" id="{67D0FB02-1202-4F84-8097-46B1F140C1A5}"/>
+              </a:ext>
+            </a:extLst>
+          </p:cNvPr>
+          <p:cNvSpPr txBox="1"/>
+          <p:nvPr/>
+        </p:nvSpPr>
+        <p:spPr>
+          <a:xfrm>
+            <a:off x="700696" y="4244586"/>
+            <a:ext cx="7651772" cy="3662541"/>
+          </a:xfrm>
+          <a:prstGeom prst="rect">
+            <a:avLst/>
+          </a:prstGeom>
+          <a:noFill/>
+        </p:spPr>
+        <p:txBody>
+          <a:bodyPr wrap="square" rtlCol="0">
+            <a:spAutoFit/>
+          </a:bodyPr>
+          <a:lstStyle/>
+          <a:p>
+            <a:pPr algn="just"/>
+            <a:r>
+              <a:rPr lang="en-GB" sz="2000" dirty="0"/>
+              <a:t>The most useful machine learning techniques are also the least interpretable but for AI to be adopted into more areas it needs to be explainable and it’s decisions justified.</a:t>
+            </a:r>
+          </a:p>
+          <a:p>
+            <a:pPr algn="just"/>
+            <a:endParaRPr lang="en-GB" sz="1600" dirty="0"/>
+          </a:p>
+          <a:p>
+            <a:pPr algn="just"/>
+            <a:r>
+              <a:rPr lang="en-GB" sz="2000" dirty="0"/>
+              <a:t>Model extraction functions as an unobtrusive addition that can provide insight into a complex model’s predictions. Decision trees are most naturally interpretable, although current approaches are flawed (greedy tree-construction)</a:t>
+            </a:r>
+          </a:p>
+          <a:p>
+            <a:pPr algn="just"/>
+            <a:endParaRPr lang="en-GB" sz="1600" dirty="0"/>
+          </a:p>
+          <a:p>
+            <a:pPr algn="just"/>
+            <a:r>
+              <a:rPr lang="en-GB" sz="2000" dirty="0"/>
+              <a:t>Using multi-objective Genetic Programming we can extract models that provide the reconstruction ability seen previously but ensure human readability by keeping tree complexity to a minimum. </a:t>
+            </a:r>
+          </a:p>
+        </p:txBody>
+      </p:sp>
+      <p:grpSp>
+        <p:nvGrpSpPr>
+          <p:cNvPr id="64" name="Group 63">
+            <a:extLst>
+              <a:ext uri="{FF2B5EF4-FFF2-40B4-BE49-F238E27FC236}">
+                <a16:creationId xmlns:a16="http://schemas.microsoft.com/office/drawing/2014/main" id="{200DB834-B55B-4869-AC7F-609A5D1A31D4}"/>
+              </a:ext>
+            </a:extLst>
+          </p:cNvPr>
+          <p:cNvGrpSpPr/>
+          <p:nvPr/>
+        </p:nvGrpSpPr>
+        <p:grpSpPr>
+          <a:xfrm>
+            <a:off x="-62665" y="11170161"/>
+            <a:ext cx="8933279" cy="2979623"/>
+            <a:chOff x="-62665" y="12493600"/>
+            <a:chExt cx="8933279" cy="2979623"/>
+          </a:xfrm>
+        </p:grpSpPr>
+        <mc:AlternateContent xmlns:mc="http://schemas.openxmlformats.org/markup-compatibility/2006">
+          <mc:Choice xmlns:a14="http://schemas.microsoft.com/office/drawing/2010/main" Requires="a14">
+            <p:sp>
+              <p:nvSpPr>
+                <p:cNvPr id="27" name="TextBox 26">
+                  <a:extLst>
+                    <a:ext uri="{FF2B5EF4-FFF2-40B4-BE49-F238E27FC236}">
+                      <a16:creationId xmlns:a16="http://schemas.microsoft.com/office/drawing/2014/main" id="{C3C5D9DB-291A-406A-941D-203402A8590E}"/>
+                    </a:ext>
+                  </a:extLst>
+                </p:cNvPr>
+                <p:cNvSpPr txBox="1"/>
+                <p:nvPr/>
+              </p:nvSpPr>
+              <p:spPr>
+                <a:xfrm>
+                  <a:off x="3583793" y="14437816"/>
+                  <a:ext cx="4518857" cy="745332"/>
+                </a:xfrm>
+                <a:prstGeom prst="rect">
+                  <a:avLst/>
+                </a:prstGeom>
+                <a:noFill/>
+              </p:spPr>
+              <p:txBody>
+                <a:bodyPr wrap="square" lIns="0" tIns="0" rIns="0" bIns="0" rtlCol="0">
+                  <a:spAutoFit/>
+                </a:bodyPr>
+                <a:lstStyle/>
+                <a:p>
+                  <a:pPr/>
+                  <a14:m>
+                    <m:oMathPara xmlns:m="http://schemas.openxmlformats.org/officeDocument/2006/math">
+                      <m:oMathParaPr>
+                        <m:jc m:val="centerGroup"/>
+                      </m:oMathParaPr>
+                      <m:oMath xmlns:m="http://schemas.openxmlformats.org/officeDocument/2006/math">
+                        <m:r>
+                          <a:rPr lang="en-GB" sz="2000" b="0" i="1" smtClean="0">
+                            <a:latin typeface="Cambria Math" panose="02040503050406030204" pitchFamily="18" charset="0"/>
+                          </a:rPr>
+                          <m:t>𝑚𝑖𝑛𝑖𝑚𝑖𝑠𝑒</m:t>
+                        </m:r>
+                        <m:nary>
+                          <m:naryPr>
+                            <m:chr m:val="∑"/>
+                            <m:subHide m:val="on"/>
+                            <m:supHide m:val="on"/>
+                            <m:ctrlPr>
+                              <a:rPr lang="en-GB" sz="2000" b="0" i="1" smtClean="0">
+                                <a:latin typeface="Cambria Math" panose="02040503050406030204" pitchFamily="18" charset="0"/>
+                              </a:rPr>
+                            </m:ctrlPr>
+                          </m:naryPr>
+                          <m:sub/>
+                          <m:sup/>
+                          <m:e>
+                            <m:r>
+                              <a:rPr lang="en-GB" sz="2000" b="0" i="1" smtClean="0">
+                                <a:latin typeface="Cambria Math" panose="02040503050406030204" pitchFamily="18" charset="0"/>
+                              </a:rPr>
+                              <m:t>𝑠𝑝𝑙𝑖𝑡</m:t>
+                            </m:r>
+                            <m:r>
+                              <a:rPr lang="en-GB" sz="2000" b="0" i="1" smtClean="0">
+                                <a:latin typeface="Cambria Math" panose="02040503050406030204" pitchFamily="18" charset="0"/>
+                              </a:rPr>
+                              <m:t>_</m:t>
+                            </m:r>
+                            <m:r>
+                              <a:rPr lang="en-GB" sz="2000" b="0" i="1" smtClean="0">
+                                <a:latin typeface="Cambria Math" panose="02040503050406030204" pitchFamily="18" charset="0"/>
+                              </a:rPr>
+                              <m:t>𝑝𝑜𝑖𝑛𝑡𝑠</m:t>
+                            </m:r>
+                          </m:e>
+                        </m:nary>
+                      </m:oMath>
+                    </m:oMathPara>
+                  </a14:m>
+                  <a:endParaRPr lang="en-GB" sz="2800" dirty="0"/>
+                </a:p>
+              </p:txBody>
+            </p:sp>
+          </mc:Choice>
+          <mc:Fallback>
+            <p:sp>
+              <p:nvSpPr>
+                <p:cNvPr id="27" name="TextBox 26">
+                  <a:extLst>
+                    <a:ext uri="{FF2B5EF4-FFF2-40B4-BE49-F238E27FC236}">
+                      <a16:creationId xmlns:a16="http://schemas.microsoft.com/office/drawing/2014/main" id="{C3C5D9DB-291A-406A-941D-203402A8590E}"/>
+                    </a:ext>
+                  </a:extLst>
+                </p:cNvPr>
+                <p:cNvSpPr txBox="1">
+                  <a:spLocks noRot="1" noChangeAspect="1" noMove="1" noResize="1" noEditPoints="1" noAdjustHandles="1" noChangeArrowheads="1" noChangeShapeType="1" noTextEdit="1"/>
+                </p:cNvSpPr>
+                <p:nvPr/>
+              </p:nvSpPr>
+              <p:spPr>
+                <a:xfrm>
+                  <a:off x="3583793" y="14437816"/>
+                  <a:ext cx="4518857" cy="745332"/>
+                </a:xfrm>
+                <a:prstGeom prst="rect">
+                  <a:avLst/>
+                </a:prstGeom>
+                <a:blipFill>
+                  <a:blip r:embed="rId12"/>
+                  <a:stretch>
+                    <a:fillRect/>
+                  </a:stretch>
+                </a:blipFill>
+              </p:spPr>
+              <p:txBody>
+                <a:bodyPr/>
+                <a:lstStyle/>
+                <a:p>
+                  <a:r>
+                    <a:rPr lang="en-GB">
+                      <a:noFill/>
+                    </a:rPr>
+                    <a:t> </a:t>
+                  </a:r>
+                </a:p>
+              </p:txBody>
+            </p:sp>
+          </mc:Fallback>
+        </mc:AlternateContent>
+        <p:grpSp>
+          <p:nvGrpSpPr>
+            <p:cNvPr id="41" name="Group 40">
+              <a:extLst>
+                <a:ext uri="{FF2B5EF4-FFF2-40B4-BE49-F238E27FC236}">
+                  <a16:creationId xmlns:a16="http://schemas.microsoft.com/office/drawing/2014/main" id="{F84BBB69-561A-434F-BCB6-132C99BD9D1D}"/>
+                </a:ext>
+              </a:extLst>
+            </p:cNvPr>
+            <p:cNvGrpSpPr/>
+            <p:nvPr/>
+          </p:nvGrpSpPr>
+          <p:grpSpPr>
+            <a:xfrm>
+              <a:off x="-62665" y="12493600"/>
+              <a:ext cx="8933279" cy="1683424"/>
+              <a:chOff x="-73363" y="12612512"/>
+              <a:chExt cx="8933279" cy="1683424"/>
+            </a:xfrm>
+          </p:grpSpPr>
+          <mc:AlternateContent xmlns:mc="http://schemas.openxmlformats.org/markup-compatibility/2006">
+            <mc:Choice xmlns:a14="http://schemas.microsoft.com/office/drawing/2010/main" Requires="a14">
+              <p:sp>
+                <p:nvSpPr>
+                  <p:cNvPr id="29" name="TextBox 28">
+                    <a:extLst>
+                      <a:ext uri="{FF2B5EF4-FFF2-40B4-BE49-F238E27FC236}">
+                        <a16:creationId xmlns:a16="http://schemas.microsoft.com/office/drawing/2014/main" id="{F34BC0A3-5C58-4D1E-AB58-06E2A1D7B69B}"/>
+                      </a:ext>
+                    </a:extLst>
+                  </p:cNvPr>
+                  <p:cNvSpPr txBox="1"/>
+                  <p:nvPr/>
+                </p:nvSpPr>
+                <p:spPr>
+                  <a:xfrm>
+                    <a:off x="-73363" y="12612512"/>
+                    <a:ext cx="8933279" cy="871713"/>
+                  </a:xfrm>
+                  <a:prstGeom prst="rect">
+                    <a:avLst/>
+                  </a:prstGeom>
+                  <a:noFill/>
+                </p:spPr>
+                <p:txBody>
+                  <a:bodyPr wrap="square" lIns="0" tIns="0" rIns="0" bIns="0" rtlCol="0">
+                    <a:spAutoFit/>
+                  </a:bodyPr>
+                  <a:lstStyle/>
+                  <a:p>
+                    <a:pPr/>
+                    <a14:m>
+                      <m:oMathPara xmlns:m="http://schemas.openxmlformats.org/officeDocument/2006/math">
+                        <m:oMathParaPr>
+                          <m:jc m:val="centerGroup"/>
+                        </m:oMathParaPr>
+                        <m:oMath xmlns:m="http://schemas.openxmlformats.org/officeDocument/2006/math">
+                          <m:r>
+                            <a:rPr lang="en-GB" sz="2000" b="0" i="1" smtClean="0">
                               <a:latin typeface="Cambria Math" panose="02040503050406030204" pitchFamily="18" charset="0"/>
                             </a:rPr>
-                          </m:ctrlPr>
-                        </m:fPr>
-                        <m:num>
+                            <m:t>𝑚𝑎𝑥𝑖𝑚𝑖𝑠𝑒</m:t>
+                          </m:r>
+                          <m:f>
+                            <m:fPr>
+                              <m:ctrlPr>
+                                <a:rPr lang="en-GB" sz="2000" b="0" i="1" smtClean="0">
+                                  <a:latin typeface="Cambria Math" panose="02040503050406030204" pitchFamily="18" charset="0"/>
+                                </a:rPr>
+                              </m:ctrlPr>
+                            </m:fPr>
+                            <m:num>
+                              <m:r>
+                                <a:rPr lang="en-GB" sz="2000" b="0" i="1" smtClean="0">
+                                  <a:latin typeface="Cambria Math" panose="02040503050406030204" pitchFamily="18" charset="0"/>
+                                </a:rPr>
+                                <m:t>1</m:t>
+                              </m:r>
+                            </m:num>
+                            <m:den>
+                              <m:r>
+                                <a:rPr lang="en-GB" sz="2000" b="0" i="1" smtClean="0">
+                                  <a:latin typeface="Cambria Math" panose="02040503050406030204" pitchFamily="18" charset="0"/>
+                                </a:rPr>
+                                <m:t>𝑘</m:t>
+                              </m:r>
+                            </m:den>
+                          </m:f>
+                          <m:nary>
+                            <m:naryPr>
+                              <m:chr m:val="∑"/>
+                              <m:ctrlPr>
+                                <a:rPr lang="en-GB" sz="2000" b="0" i="1" smtClean="0">
+                                  <a:latin typeface="Cambria Math" panose="02040503050406030204" pitchFamily="18" charset="0"/>
+                                </a:rPr>
+                              </m:ctrlPr>
+                            </m:naryPr>
+                            <m:sub>
+                              <m:r>
+                                <m:rPr>
+                                  <m:brk m:alnAt="23"/>
+                                </m:rPr>
+                                <a:rPr lang="en-GB" sz="2000" b="0" i="1" smtClean="0">
+                                  <a:latin typeface="Cambria Math" panose="02040503050406030204" pitchFamily="18" charset="0"/>
+                                </a:rPr>
+                                <m:t>𝑖</m:t>
+                              </m:r>
+                              <m:r>
+                                <a:rPr lang="en-GB" sz="2000" b="0" i="1" smtClean="0">
+                                  <a:latin typeface="Cambria Math" panose="02040503050406030204" pitchFamily="18" charset="0"/>
+                                </a:rPr>
+                                <m:t>=1</m:t>
+                              </m:r>
+                            </m:sub>
+                            <m:sup>
+                              <m:r>
+                                <a:rPr lang="en-GB" sz="2000" b="0" i="1" smtClean="0">
+                                  <a:latin typeface="Cambria Math" panose="02040503050406030204" pitchFamily="18" charset="0"/>
+                                </a:rPr>
+                                <m:t>𝑘</m:t>
+                              </m:r>
+                            </m:sup>
+                            <m:e>
+                              <m:r>
+                                <a:rPr lang="en-GB" sz="2000" b="0" i="1" smtClean="0">
+                                  <a:latin typeface="Cambria Math" panose="02040503050406030204" pitchFamily="18" charset="0"/>
+                                </a:rPr>
+                                <m:t>𝑓</m:t>
+                              </m:r>
+                              <m:r>
+                                <a:rPr lang="en-GB" sz="2000" b="0" i="1" smtClean="0">
+                                  <a:latin typeface="Cambria Math" panose="02040503050406030204" pitchFamily="18" charset="0"/>
+                                </a:rPr>
+                                <m:t>1(</m:t>
+                              </m:r>
+                              <m:r>
+                                <a:rPr lang="en-GB" sz="2000" b="0" i="1" smtClean="0">
+                                  <a:latin typeface="Cambria Math" panose="02040503050406030204" pitchFamily="18" charset="0"/>
+                                </a:rPr>
+                                <m:t>𝑝𝑟𝑒𝑑𝑖𝑐𝑡</m:t>
+                              </m:r>
+                              <m:r>
+                                <a:rPr lang="en-GB" sz="2000" b="0" i="1" smtClean="0">
+                                  <a:latin typeface="Cambria Math" panose="02040503050406030204" pitchFamily="18" charset="0"/>
+                                </a:rPr>
+                                <m:t>(</m:t>
+                              </m:r>
+                              <m:r>
+                                <a:rPr lang="en-GB" sz="2000" b="0" i="1" smtClean="0">
+                                  <a:latin typeface="Cambria Math" panose="02040503050406030204" pitchFamily="18" charset="0"/>
+                                </a:rPr>
+                                <m:t>𝑓𝑜𝑙𝑑</m:t>
+                              </m:r>
+                              <m:d>
+                                <m:dPr>
+                                  <m:ctrlPr>
+                                    <a:rPr lang="en-GB" sz="2000" b="0" i="1" smtClean="0">
+                                      <a:latin typeface="Cambria Math" panose="02040503050406030204" pitchFamily="18" charset="0"/>
+                                    </a:rPr>
+                                  </m:ctrlPr>
+                                </m:dPr>
+                                <m:e>
+                                  <m:r>
+                                    <a:rPr lang="en-GB" sz="2000" b="0" i="1" smtClean="0">
+                                      <a:latin typeface="Cambria Math" panose="02040503050406030204" pitchFamily="18" charset="0"/>
+                                    </a:rPr>
+                                    <m:t>𝑖</m:t>
+                                  </m:r>
+                                </m:e>
+                              </m:d>
+                              <m:r>
+                                <a:rPr lang="en-GB" sz="2000" b="0" i="1" smtClean="0">
+                                  <a:latin typeface="Cambria Math" panose="02040503050406030204" pitchFamily="18" charset="0"/>
+                                </a:rPr>
+                                <m:t>),</m:t>
+                              </m:r>
+                              <m:r>
+                                <a:rPr lang="en-GB" sz="2000" b="0" i="1" smtClean="0">
+                                  <a:latin typeface="Cambria Math" panose="02040503050406030204" pitchFamily="18" charset="0"/>
+                                </a:rPr>
+                                <m:t>𝑏𝑙𝑎𝑐𝑘𝑏𝑜𝑥</m:t>
+                              </m:r>
+                              <m:r>
+                                <a:rPr lang="en-GB" sz="2000" b="0" i="1" smtClean="0">
+                                  <a:latin typeface="Cambria Math" panose="02040503050406030204" pitchFamily="18" charset="0"/>
+                                </a:rPr>
+                                <m:t>_</m:t>
+                              </m:r>
+                              <m:r>
+                                <a:rPr lang="en-GB" sz="2000" b="0" i="1" smtClean="0">
+                                  <a:latin typeface="Cambria Math" panose="02040503050406030204" pitchFamily="18" charset="0"/>
+                                </a:rPr>
+                                <m:t>𝑝𝑟𝑒𝑑𝑖𝑐𝑡</m:t>
+                              </m:r>
+                              <m:r>
+                                <a:rPr lang="en-GB" sz="2000" b="0" i="1" smtClean="0">
+                                  <a:latin typeface="Cambria Math" panose="02040503050406030204" pitchFamily="18" charset="0"/>
+                                </a:rPr>
+                                <m:t>(</m:t>
+                              </m:r>
+                              <m:r>
+                                <a:rPr lang="en-GB" sz="2000" b="0" i="1" smtClean="0">
+                                  <a:latin typeface="Cambria Math" panose="02040503050406030204" pitchFamily="18" charset="0"/>
+                                </a:rPr>
+                                <m:t>𝑓𝑜𝑙𝑑</m:t>
+                              </m:r>
+                              <m:d>
+                                <m:dPr>
+                                  <m:ctrlPr>
+                                    <a:rPr lang="en-GB" sz="2000" b="0" i="1" smtClean="0">
+                                      <a:latin typeface="Cambria Math" panose="02040503050406030204" pitchFamily="18" charset="0"/>
+                                    </a:rPr>
+                                  </m:ctrlPr>
+                                </m:dPr>
+                                <m:e>
+                                  <m:r>
+                                    <a:rPr lang="en-GB" sz="2000" b="0" i="1" smtClean="0">
+                                      <a:latin typeface="Cambria Math" panose="02040503050406030204" pitchFamily="18" charset="0"/>
+                                    </a:rPr>
+                                    <m:t>𝑖</m:t>
+                                  </m:r>
+                                </m:e>
+                              </m:d>
+                              <m:r>
+                                <a:rPr lang="en-GB" sz="2000" b="0" i="1" smtClean="0">
+                                  <a:latin typeface="Cambria Math" panose="02040503050406030204" pitchFamily="18" charset="0"/>
+                                </a:rPr>
+                                <m:t>))</m:t>
+                              </m:r>
+                            </m:e>
+                          </m:nary>
+                        </m:oMath>
+                      </m:oMathPara>
+                    </a14:m>
+                    <a:endParaRPr lang="en-GB" dirty="0"/>
+                  </a:p>
+                </p:txBody>
+              </p:sp>
+            </mc:Choice>
+            <mc:Fallback>
+              <p:sp>
+                <p:nvSpPr>
+                  <p:cNvPr id="29" name="TextBox 28">
+                    <a:extLst>
+                      <a:ext uri="{FF2B5EF4-FFF2-40B4-BE49-F238E27FC236}">
+                        <a16:creationId xmlns:a16="http://schemas.microsoft.com/office/drawing/2014/main" id="{F34BC0A3-5C58-4D1E-AB58-06E2A1D7B69B}"/>
+                      </a:ext>
+                    </a:extLst>
+                  </p:cNvPr>
+                  <p:cNvSpPr txBox="1">
+                    <a:spLocks noRot="1" noChangeAspect="1" noMove="1" noResize="1" noEditPoints="1" noAdjustHandles="1" noChangeArrowheads="1" noChangeShapeType="1" noTextEdit="1"/>
+                  </p:cNvSpPr>
+                  <p:nvPr/>
+                </p:nvSpPr>
+                <p:spPr>
+                  <a:xfrm>
+                    <a:off x="-73363" y="12612512"/>
+                    <a:ext cx="8933279" cy="871713"/>
+                  </a:xfrm>
+                  <a:prstGeom prst="rect">
+                    <a:avLst/>
+                  </a:prstGeom>
+                  <a:blipFill>
+                    <a:blip r:embed="rId13"/>
+                    <a:stretch>
+                      <a:fillRect/>
+                    </a:stretch>
+                  </a:blipFill>
+                </p:spPr>
+                <p:txBody>
+                  <a:bodyPr/>
+                  <a:lstStyle/>
+                  <a:p>
+                    <a:r>
+                      <a:rPr lang="en-GB">
+                        <a:noFill/>
+                      </a:rPr>
+                      <a:t> </a:t>
+                    </a:r>
+                  </a:p>
+                </p:txBody>
+              </p:sp>
+            </mc:Fallback>
+          </mc:AlternateContent>
+          <mc:AlternateContent xmlns:mc="http://schemas.openxmlformats.org/markup-compatibility/2006">
+            <mc:Choice xmlns:a14="http://schemas.microsoft.com/office/drawing/2010/main" Requires="a14">
+              <p:sp>
+                <p:nvSpPr>
+                  <p:cNvPr id="30" name="TextBox 29">
+                    <a:extLst>
+                      <a:ext uri="{FF2B5EF4-FFF2-40B4-BE49-F238E27FC236}">
+                        <a16:creationId xmlns:a16="http://schemas.microsoft.com/office/drawing/2014/main" id="{0176BFC8-13F4-4CB7-9752-140161DD25FF}"/>
+                      </a:ext>
+                    </a:extLst>
+                  </p:cNvPr>
+                  <p:cNvSpPr txBox="1"/>
+                  <p:nvPr/>
+                </p:nvSpPr>
+                <p:spPr>
+                  <a:xfrm>
+                    <a:off x="762044" y="13548616"/>
+                    <a:ext cx="7309116" cy="747320"/>
+                  </a:xfrm>
+                  <a:prstGeom prst="rect">
+                    <a:avLst/>
+                  </a:prstGeom>
+                  <a:noFill/>
+                </p:spPr>
+                <p:txBody>
+                  <a:bodyPr wrap="square" lIns="0" tIns="0" rIns="0" bIns="0" rtlCol="0">
+                    <a:spAutoFit/>
+                  </a:bodyPr>
+                  <a:lstStyle/>
+                  <a:p>
+                    <a:pPr/>
+                    <a14:m>
+                      <m:oMathPara xmlns:m="http://schemas.openxmlformats.org/officeDocument/2006/math">
+                        <m:oMathParaPr>
+                          <m:jc m:val="centerGroup"/>
+                        </m:oMathParaPr>
+                        <m:oMath xmlns:m="http://schemas.openxmlformats.org/officeDocument/2006/math">
                           <m:r>
-                            <a:rPr lang="en-GB" sz="2400" b="0" i="1" smtClean="0">
-                              <a:latin typeface="Cambria Math" panose="02040503050406030204" pitchFamily="18" charset="0"/>
-                            </a:rPr>
-                            <m:t>1</m:t>
-                          </m:r>
-                        </m:num>
-                        <m:den>
-                          <m:r>
-                            <a:rPr lang="en-GB" sz="2400" b="0" i="1" smtClean="0">
-                              <a:latin typeface="Cambria Math" panose="02040503050406030204" pitchFamily="18" charset="0"/>
-                            </a:rPr>
-                            <m:t>𝑘</m:t>
-                          </m:r>
-                        </m:den>
-                      </m:f>
-                      <m:nary>
-                        <m:naryPr>
-                          <m:chr m:val="∑"/>
-                          <m:ctrlPr>
-                            <a:rPr lang="en-GB" sz="2400" b="0" i="1" smtClean="0">
-                              <a:latin typeface="Cambria Math" panose="02040503050406030204" pitchFamily="18" charset="0"/>
-                            </a:rPr>
-                          </m:ctrlPr>
-                        </m:naryPr>
-                        <m:sub>
-                          <m:r>
-                            <m:rPr>
-                              <m:brk m:alnAt="23"/>
-                            </m:rPr>
-                            <a:rPr lang="en-GB" sz="2400" b="0" i="1" smtClean="0">
-                              <a:latin typeface="Cambria Math" panose="02040503050406030204" pitchFamily="18" charset="0"/>
-                            </a:rPr>
-                            <m:t>𝑖</m:t>
-                          </m:r>
-                          <m:r>
-                            <a:rPr lang="en-GB" sz="2400" b="0" i="1" smtClean="0">
-                              <a:latin typeface="Cambria Math" panose="02040503050406030204" pitchFamily="18" charset="0"/>
-                            </a:rPr>
-                            <m:t>=1</m:t>
-                          </m:r>
-                        </m:sub>
-                        <m:sup>
-                          <m:r>
-                            <a:rPr lang="en-GB" sz="2400" b="0" i="1" smtClean="0">
-                              <a:latin typeface="Cambria Math" panose="02040503050406030204" pitchFamily="18" charset="0"/>
-                            </a:rPr>
-                            <m:t>𝑘</m:t>
-                          </m:r>
-                        </m:sup>
-                        <m:e>
-                          <m:r>
-                            <a:rPr lang="en-GB" sz="2400" b="0" i="1" smtClean="0">
+                            <a:rPr lang="en-GB" sz="2000" b="0" i="1" smtClean="0">
                               <a:latin typeface="Cambria Math" panose="02040503050406030204" pitchFamily="18" charset="0"/>
                             </a:rPr>
                             <m:t>𝑓</m:t>
                           </m:r>
                           <m:r>
-                            <a:rPr lang="en-GB" sz="2400" b="0" i="1" smtClean="0">
+                            <a:rPr lang="en-GB" sz="2000" b="0" i="1" smtClean="0">
                               <a:latin typeface="Cambria Math" panose="02040503050406030204" pitchFamily="18" charset="0"/>
                             </a:rPr>
-                            <m:t>1(</m:t>
-                          </m:r>
-                          <m:r>
-                            <a:rPr lang="en-GB" sz="2400" b="0" i="1" smtClean="0">
-                              <a:latin typeface="Cambria Math" panose="02040503050406030204" pitchFamily="18" charset="0"/>
-                            </a:rPr>
-                            <m:t>𝑝𝑟𝑒𝑑𝑖𝑐𝑡</m:t>
-                          </m:r>
-                          <m:r>
-                            <a:rPr lang="en-GB" sz="2400" b="0" i="1" smtClean="0">
-                              <a:latin typeface="Cambria Math" panose="02040503050406030204" pitchFamily="18" charset="0"/>
-                            </a:rPr>
-                            <m:t>(</m:t>
-                          </m:r>
-                          <m:r>
-                            <a:rPr lang="en-GB" sz="2400" b="0" i="1" smtClean="0">
-                              <a:latin typeface="Cambria Math" panose="02040503050406030204" pitchFamily="18" charset="0"/>
-                            </a:rPr>
-                            <m:t>𝑓𝑜𝑙𝑑</m:t>
+                            <m:t>1</m:t>
                           </m:r>
                           <m:d>
                             <m:dPr>
-                              <m:ctrlPr>
-                                <a:rPr lang="en-GB" sz="2400" b="0" i="1" smtClean="0">
-                                  <a:latin typeface="Cambria Math" panose="02040503050406030204" pitchFamily="18" charset="0"/>
-                                </a:rPr>
-                              </m:ctrlPr>
-                            </m:dPr>
-                            <m:e>
-                              <m:r>
-                                <a:rPr lang="en-GB" sz="2400" b="0" i="1" smtClean="0">
-                                  <a:latin typeface="Cambria Math" panose="02040503050406030204" pitchFamily="18" charset="0"/>
-                                </a:rPr>
-                                <m:t>𝑖</m:t>
-                              </m:r>
-                            </m:e>
-                          </m:d>
-                          <m:r>
-                            <a:rPr lang="en-GB" sz="2400" b="0" i="1" smtClean="0">
-                              <a:latin typeface="Cambria Math" panose="02040503050406030204" pitchFamily="18" charset="0"/>
-                            </a:rPr>
-                            <m:t>),</m:t>
-                          </m:r>
-                          <m:r>
-                            <a:rPr lang="en-GB" sz="2400" b="0" i="1" smtClean="0">
-                              <a:latin typeface="Cambria Math" panose="02040503050406030204" pitchFamily="18" charset="0"/>
-                            </a:rPr>
-                            <m:t>𝑏𝑙𝑎𝑐𝑘𝑏𝑜𝑥</m:t>
-                          </m:r>
-                          <m:r>
-                            <a:rPr lang="en-GB" sz="2400" b="0" i="1" smtClean="0">
-                              <a:latin typeface="Cambria Math" panose="02040503050406030204" pitchFamily="18" charset="0"/>
-                            </a:rPr>
-                            <m:t>_</m:t>
-                          </m:r>
-                          <m:r>
-                            <a:rPr lang="en-GB" sz="2400" b="0" i="1" smtClean="0">
-                              <a:latin typeface="Cambria Math" panose="02040503050406030204" pitchFamily="18" charset="0"/>
-                            </a:rPr>
-                            <m:t>𝑝𝑟𝑒𝑑𝑖𝑐𝑡</m:t>
-                          </m:r>
-                          <m:r>
-                            <a:rPr lang="en-GB" sz="2400" b="0" i="1" smtClean="0">
-                              <a:latin typeface="Cambria Math" panose="02040503050406030204" pitchFamily="18" charset="0"/>
-                            </a:rPr>
-                            <m:t>(</m:t>
-                          </m:r>
-                          <m:r>
-                            <a:rPr lang="en-GB" sz="2400" b="0" i="1" smtClean="0">
-                              <a:latin typeface="Cambria Math" panose="02040503050406030204" pitchFamily="18" charset="0"/>
-                            </a:rPr>
-                            <m:t>𝑓𝑜𝑙𝑑</m:t>
-                          </m:r>
-                          <m:d>
-                            <m:dPr>
-                              <m:ctrlPr>
-                                <a:rPr lang="en-GB" sz="2400" b="0" i="1" smtClean="0">
-                                  <a:latin typeface="Cambria Math" panose="02040503050406030204" pitchFamily="18" charset="0"/>
-                                </a:rPr>
-                              </m:ctrlPr>
-                            </m:dPr>
-                            <m:e>
-                              <m:r>
-                                <a:rPr lang="en-GB" sz="2400" b="0" i="1" smtClean="0">
-                                  <a:latin typeface="Cambria Math" panose="02040503050406030204" pitchFamily="18" charset="0"/>
-                                </a:rPr>
-                                <m:t>𝑖</m:t>
-                              </m:r>
-                            </m:e>
-                          </m:d>
-                          <m:r>
-                            <a:rPr lang="en-GB" sz="2400" b="0" i="1" smtClean="0">
-                              <a:latin typeface="Cambria Math" panose="02040503050406030204" pitchFamily="18" charset="0"/>
-                            </a:rPr>
-                            <m:t>))</m:t>
-                          </m:r>
-                        </m:e>
-                      </m:nary>
-                    </m:oMath>
-                  </m:oMathPara>
-                </a14:m>
-                <a:endParaRPr lang="en-GB" dirty="0"/>
-              </a:p>
-            </p:txBody>
-          </p:sp>
-        </mc:Choice>
-        <mc:Fallback>
-          <p:sp>
-            <p:nvSpPr>
-              <p:cNvPr id="29" name="TextBox 28">
-                <a:extLst>
-                  <a:ext uri="{FF2B5EF4-FFF2-40B4-BE49-F238E27FC236}">
-                    <a16:creationId xmlns:a16="http://schemas.microsoft.com/office/drawing/2014/main" id="{F34BC0A3-5C58-4D1E-AB58-06E2A1D7B69B}"/>
-                  </a:ext>
-                </a:extLst>
-              </p:cNvPr>
-              <p:cNvSpPr txBox="1">
-                <a:spLocks noRot="1" noChangeAspect="1" noMove="1" noResize="1" noEditPoints="1" noAdjustHandles="1" noChangeArrowheads="1" noChangeShapeType="1" noTextEdit="1"/>
-              </p:cNvSpPr>
-              <p:nvPr/>
-            </p:nvSpPr>
-            <p:spPr>
-              <a:xfrm>
-                <a:off x="89776" y="14070709"/>
-                <a:ext cx="8933279" cy="1045927"/>
-              </a:xfrm>
-              <a:prstGeom prst="rect">
-                <a:avLst/>
-              </a:prstGeom>
-              <a:blipFill>
-                <a:blip r:embed="rId14"/>
-                <a:stretch>
-                  <a:fillRect/>
-                </a:stretch>
-              </a:blipFill>
-            </p:spPr>
-            <p:txBody>
-              <a:bodyPr/>
-              <a:lstStyle/>
-              <a:p>
-                <a:r>
-                  <a:rPr lang="en-GB">
-                    <a:noFill/>
-                  </a:rPr>
-                  <a:t> </a:t>
-                </a:r>
-              </a:p>
-            </p:txBody>
-          </p:sp>
-        </mc:Fallback>
-      </mc:AlternateContent>
-      <mc:AlternateContent xmlns:mc="http://schemas.openxmlformats.org/markup-compatibility/2006">
-        <mc:Choice xmlns:a14="http://schemas.microsoft.com/office/drawing/2010/main" Requires="a14">
-          <p:sp>
-            <p:nvSpPr>
-              <p:cNvPr id="30" name="TextBox 29">
-                <a:extLst>
-                  <a:ext uri="{FF2B5EF4-FFF2-40B4-BE49-F238E27FC236}">
-                    <a16:creationId xmlns:a16="http://schemas.microsoft.com/office/drawing/2014/main" id="{0176BFC8-13F4-4CB7-9752-140161DD25FF}"/>
-                  </a:ext>
-                </a:extLst>
-              </p:cNvPr>
-              <p:cNvSpPr txBox="1"/>
-              <p:nvPr/>
-            </p:nvSpPr>
-            <p:spPr>
-              <a:xfrm>
-                <a:off x="1172655" y="15145756"/>
-                <a:ext cx="7309116" cy="747320"/>
-              </a:xfrm>
-              <a:prstGeom prst="rect">
-                <a:avLst/>
-              </a:prstGeom>
-              <a:noFill/>
-            </p:spPr>
-            <p:txBody>
-              <a:bodyPr wrap="none" lIns="0" tIns="0" rIns="0" bIns="0" rtlCol="0">
-                <a:spAutoFit/>
-              </a:bodyPr>
-              <a:lstStyle/>
-              <a:p>
-                <a14:m>
-                  <m:oMathPara xmlns:m="http://schemas.openxmlformats.org/officeDocument/2006/math">
-                    <m:oMathParaPr>
-                      <m:jc m:val="centerGroup"/>
-                    </m:oMathParaPr>
-                    <m:oMath xmlns:m="http://schemas.openxmlformats.org/officeDocument/2006/math">
-                      <m:r>
-                        <a:rPr lang="en-GB" sz="2000" b="0" i="1" smtClean="0">
-                          <a:latin typeface="Cambria Math" panose="02040503050406030204" pitchFamily="18" charset="0"/>
-                        </a:rPr>
-                        <m:t>𝑓</m:t>
-                      </m:r>
-                      <m:r>
-                        <a:rPr lang="en-GB" sz="2000" b="0" i="1" smtClean="0">
-                          <a:latin typeface="Cambria Math" panose="02040503050406030204" pitchFamily="18" charset="0"/>
-                        </a:rPr>
-                        <m:t>1</m:t>
-                      </m:r>
-                      <m:d>
-                        <m:dPr>
-                          <m:ctrlPr>
-                            <a:rPr lang="en-GB" sz="2000" b="0" i="1" smtClean="0">
-                              <a:latin typeface="Cambria Math" panose="02040503050406030204" pitchFamily="18" charset="0"/>
-                            </a:rPr>
-                          </m:ctrlPr>
-                        </m:dPr>
-                        <m:e>
-                          <m:r>
-                            <a:rPr lang="en-GB" sz="2000" b="0" i="1" smtClean="0">
-                              <a:latin typeface="Cambria Math" panose="02040503050406030204" pitchFamily="18" charset="0"/>
-                            </a:rPr>
-                            <m:t>𝑝𝑟𝑒𝑑𝑖𝑐𝑡𝑒𝑑</m:t>
-                          </m:r>
-                          <m:r>
-                            <a:rPr lang="en-GB" sz="2000" b="0" i="1" smtClean="0">
-                              <a:latin typeface="Cambria Math" panose="02040503050406030204" pitchFamily="18" charset="0"/>
-                            </a:rPr>
-                            <m:t>, </m:t>
-                          </m:r>
-                          <m:r>
-                            <a:rPr lang="en-GB" sz="2000" b="0" i="1" smtClean="0">
-                              <a:latin typeface="Cambria Math" panose="02040503050406030204" pitchFamily="18" charset="0"/>
-                            </a:rPr>
-                            <m:t>𝑟𝑒𝑎𝑙</m:t>
-                          </m:r>
-                        </m:e>
-                      </m:d>
-                      <m:r>
-                        <a:rPr lang="en-GB" sz="2000" b="0" i="1" smtClean="0">
-                          <a:latin typeface="Cambria Math" panose="02040503050406030204" pitchFamily="18" charset="0"/>
-                        </a:rPr>
-                        <m:t>=(</m:t>
-                      </m:r>
-                      <m:nary>
-                        <m:naryPr>
-                          <m:chr m:val="∑"/>
-                          <m:supHide m:val="on"/>
-                          <m:ctrlPr>
-                            <a:rPr lang="en-GB" sz="2000" b="0" i="1" smtClean="0">
-                              <a:latin typeface="Cambria Math" panose="02040503050406030204" pitchFamily="18" charset="0"/>
-                            </a:rPr>
-                          </m:ctrlPr>
-                        </m:naryPr>
-                        <m:sub>
-                          <m:r>
-                            <m:rPr>
-                              <m:brk m:alnAt="7"/>
-                            </m:rPr>
-                            <a:rPr lang="en-GB" sz="2000" b="0" i="1" smtClean="0">
-                              <a:latin typeface="Cambria Math" panose="02040503050406030204" pitchFamily="18" charset="0"/>
-                            </a:rPr>
-                            <m:t>𝑐</m:t>
-                          </m:r>
-                          <m:r>
-                            <a:rPr lang="en-GB" sz="2000" b="0" i="1" smtClean="0">
-                              <a:latin typeface="Cambria Math" panose="02040503050406030204" pitchFamily="18" charset="0"/>
-                              <a:ea typeface="Cambria Math" panose="02040503050406030204" pitchFamily="18" charset="0"/>
-                            </a:rPr>
-                            <m:t>∈</m:t>
-                          </m:r>
-                          <m:r>
-                            <a:rPr lang="en-GB" sz="2000" b="0" i="1" smtClean="0">
-                              <a:latin typeface="Cambria Math" panose="02040503050406030204" pitchFamily="18" charset="0"/>
-                              <a:ea typeface="Cambria Math" panose="02040503050406030204" pitchFamily="18" charset="0"/>
-                            </a:rPr>
-                            <m:t>𝐶</m:t>
-                          </m:r>
-                        </m:sub>
-                        <m:sup/>
-                        <m:e>
-                          <m:d>
-                            <m:dPr>
-                              <m:begChr m:val="|"/>
-                              <m:endChr m:val="|"/>
                               <m:ctrlPr>
                                 <a:rPr lang="en-GB" sz="2000" b="0" i="1" smtClean="0">
                                   <a:latin typeface="Cambria Math" panose="02040503050406030204" pitchFamily="18" charset="0"/>
@@ -5466,7 +5571,19 @@
                                 <a:rPr lang="en-GB" sz="2000" b="0" i="1" smtClean="0">
                                   <a:latin typeface="Cambria Math" panose="02040503050406030204" pitchFamily="18" charset="0"/>
                                 </a:rPr>
-                                <m:t>𝐶</m:t>
+                                <m:t>𝑝𝑟𝑒𝑑𝑖𝑐𝑡𝑒𝑑</m:t>
+                              </m:r>
+                              <m:r>
+                                <a:rPr lang="en-GB" sz="2000" b="0" i="1" smtClean="0">
+                                  <a:latin typeface="Cambria Math" panose="02040503050406030204" pitchFamily="18" charset="0"/>
+                                </a:rPr>
+                                <m:t>, </m:t>
+                              </m:r>
+                              <m:r>
+                                <a:rPr lang="en-GB" sz="2000" b="0" i="1" smtClean="0">
+                                  <a:latin typeface="Cambria Math" panose="02040503050406030204" pitchFamily="18" charset="0"/>
+                                </a:rPr>
+                                <m:t>𝑟𝑒𝑎𝑙</m:t>
                               </m:r>
                             </m:e>
                           </m:d>
@@ -5474,84 +5591,7 @@
                             <a:rPr lang="en-GB" sz="2000" b="0" i="1" smtClean="0">
                               <a:latin typeface="Cambria Math" panose="02040503050406030204" pitchFamily="18" charset="0"/>
                             </a:rPr>
-                            <m:t> </m:t>
-                          </m:r>
-                          <m:r>
-                            <a:rPr lang="en-GB" sz="2000" b="0" i="1" smtClean="0">
-                              <a:latin typeface="Cambria Math" panose="02040503050406030204" pitchFamily="18" charset="0"/>
-                              <a:ea typeface="Cambria Math" panose="02040503050406030204" pitchFamily="18" charset="0"/>
-                            </a:rPr>
-                            <m:t>× </m:t>
-                          </m:r>
-                          <m:f>
-                            <m:fPr>
-                              <m:ctrlPr>
-                                <a:rPr lang="en-GB" sz="2000" b="0" i="1" smtClean="0">
-                                  <a:latin typeface="Cambria Math" panose="02040503050406030204" pitchFamily="18" charset="0"/>
-                                  <a:ea typeface="Cambria Math" panose="02040503050406030204" pitchFamily="18" charset="0"/>
-                                </a:rPr>
-                              </m:ctrlPr>
-                            </m:fPr>
-                            <m:num>
-                              <m:r>
-                                <a:rPr lang="en-GB" sz="2000" b="0" i="1" smtClean="0">
-                                  <a:latin typeface="Cambria Math" panose="02040503050406030204" pitchFamily="18" charset="0"/>
-                                  <a:ea typeface="Cambria Math" panose="02040503050406030204" pitchFamily="18" charset="0"/>
-                                </a:rPr>
-                                <m:t>2×</m:t>
-                              </m:r>
-                              <m:r>
-                                <a:rPr lang="en-GB" sz="2000" b="0" i="1" smtClean="0">
-                                  <a:latin typeface="Cambria Math" panose="02040503050406030204" pitchFamily="18" charset="0"/>
-                                  <a:ea typeface="Cambria Math" panose="02040503050406030204" pitchFamily="18" charset="0"/>
-                                </a:rPr>
-                                <m:t>𝑝𝑟𝑒𝑐𝑖𝑠𝑖𝑜𝑛</m:t>
-                              </m:r>
-                              <m:r>
-                                <a:rPr lang="en-GB" sz="2000" b="0" i="1" smtClean="0">
-                                  <a:latin typeface="Cambria Math" panose="02040503050406030204" pitchFamily="18" charset="0"/>
-                                  <a:ea typeface="Cambria Math" panose="02040503050406030204" pitchFamily="18" charset="0"/>
-                                </a:rPr>
-                                <m:t>×</m:t>
-                              </m:r>
-                              <m:r>
-                                <a:rPr lang="en-GB" sz="2000" b="0" i="1" smtClean="0">
-                                  <a:latin typeface="Cambria Math" panose="02040503050406030204" pitchFamily="18" charset="0"/>
-                                  <a:ea typeface="Cambria Math" panose="02040503050406030204" pitchFamily="18" charset="0"/>
-                                </a:rPr>
-                                <m:t>𝑟𝑒𝑐𝑎𝑙𝑙</m:t>
-                              </m:r>
-                            </m:num>
-                            <m:den>
-                              <m:r>
-                                <a:rPr lang="en-GB" sz="2000" b="0" i="1" smtClean="0">
-                                  <a:latin typeface="Cambria Math" panose="02040503050406030204" pitchFamily="18" charset="0"/>
-                                  <a:ea typeface="Cambria Math" panose="02040503050406030204" pitchFamily="18" charset="0"/>
-                                </a:rPr>
-                                <m:t>𝑝𝑟𝑒𝑐𝑖𝑠𝑖𝑜𝑛</m:t>
-                              </m:r>
-                              <m:r>
-                                <a:rPr lang="en-GB" sz="2000" b="0" i="1" smtClean="0">
-                                  <a:latin typeface="Cambria Math" panose="02040503050406030204" pitchFamily="18" charset="0"/>
-                                  <a:ea typeface="Cambria Math" panose="02040503050406030204" pitchFamily="18" charset="0"/>
-                                </a:rPr>
-                                <m:t>+</m:t>
-                              </m:r>
-                              <m:r>
-                                <a:rPr lang="en-GB" sz="2000" b="0" i="1" smtClean="0">
-                                  <a:latin typeface="Cambria Math" panose="02040503050406030204" pitchFamily="18" charset="0"/>
-                                  <a:ea typeface="Cambria Math" panose="02040503050406030204" pitchFamily="18" charset="0"/>
-                                </a:rPr>
-                                <m:t>𝑟𝑒𝑐𝑎𝑙𝑙</m:t>
-                              </m:r>
-                            </m:den>
-                          </m:f>
-                          <m:r>
-                            <a:rPr lang="en-GB" sz="2000" b="0" i="1" smtClean="0">
-                              <a:latin typeface="Cambria Math" panose="02040503050406030204" pitchFamily="18" charset="0"/>
-                              <a:ea typeface="Cambria Math" panose="02040503050406030204" pitchFamily="18" charset="0"/>
-                            </a:rPr>
-                            <m:t>)/</m:t>
+                            <m:t>=(</m:t>
                           </m:r>
                           <m:nary>
                             <m:naryPr>
@@ -5560,7 +5600,6 @@
                               <m:ctrlPr>
                                 <a:rPr lang="en-GB" sz="2000" b="0" i="1" smtClean="0">
                                   <a:latin typeface="Cambria Math" panose="02040503050406030204" pitchFamily="18" charset="0"/>
-                                  <a:ea typeface="Cambria Math" panose="02040503050406030204" pitchFamily="18" charset="0"/>
                                 </a:rPr>
                               </m:ctrlPr>
                             </m:naryPr>
@@ -5571,7 +5610,6 @@
                                 </m:rPr>
                                 <a:rPr lang="en-GB" sz="2000" b="0" i="1" smtClean="0">
                                   <a:latin typeface="Cambria Math" panose="02040503050406030204" pitchFamily="18" charset="0"/>
-                                  <a:ea typeface="Cambria Math" panose="02040503050406030204" pitchFamily="18" charset="0"/>
                                 </a:rPr>
                                 <m:t>𝑐</m:t>
                               </m:r>
@@ -5592,90 +5630,503 @@
                             </m:sub>
                             <m:sup/>
                             <m:e>
+                              <m:d>
+                                <m:dPr>
+                                  <m:begChr m:val="|"/>
+                                  <m:endChr m:val="|"/>
+                                  <m:ctrlPr>
+                                    <a:rPr lang="en-GB" sz="2000" b="0" i="1" smtClean="0">
+                                      <a:latin typeface="Cambria Math" panose="02040503050406030204" pitchFamily="18" charset="0"/>
+                                    </a:rPr>
+                                  </m:ctrlPr>
+                                </m:dPr>
+                                <m:e>
+                                  <m:r>
+                                    <a:rPr lang="en-GB" sz="2000" b="0" i="1" smtClean="0">
+                                      <a:latin typeface="Cambria Math" panose="02040503050406030204" pitchFamily="18" charset="0"/>
+                                    </a:rPr>
+                                    <m:t>𝐶</m:t>
+                                  </m:r>
+                                </m:e>
+                              </m:d>
                               <m:r>
                                 <a:rPr lang="en-GB" sz="2000" b="0" i="1" smtClean="0">
                                   <a:latin typeface="Cambria Math" panose="02040503050406030204" pitchFamily="18" charset="0"/>
-                                  <a:ea typeface="Cambria Math" panose="02040503050406030204" pitchFamily="18" charset="0"/>
                                 </a:rPr>
-                                <m:t>|</m:t>
+                                <m:t> </m:t>
                               </m:r>
                               <m:r>
                                 <a:rPr lang="en-GB" sz="2000" b="0" i="1" smtClean="0">
                                   <a:latin typeface="Cambria Math" panose="02040503050406030204" pitchFamily="18" charset="0"/>
                                   <a:ea typeface="Cambria Math" panose="02040503050406030204" pitchFamily="18" charset="0"/>
                                 </a:rPr>
-                                <m:t>𝐶</m:t>
+                                <m:t>× </m:t>
                               </m:r>
+                              <m:f>
+                                <m:fPr>
+                                  <m:ctrlPr>
+                                    <a:rPr lang="en-GB" sz="2000" b="0" i="1" smtClean="0">
+                                      <a:latin typeface="Cambria Math" panose="02040503050406030204" pitchFamily="18" charset="0"/>
+                                      <a:ea typeface="Cambria Math" panose="02040503050406030204" pitchFamily="18" charset="0"/>
+                                    </a:rPr>
+                                  </m:ctrlPr>
+                                </m:fPr>
+                                <m:num>
+                                  <m:r>
+                                    <a:rPr lang="en-GB" sz="2000" b="0" i="1" smtClean="0">
+                                      <a:latin typeface="Cambria Math" panose="02040503050406030204" pitchFamily="18" charset="0"/>
+                                      <a:ea typeface="Cambria Math" panose="02040503050406030204" pitchFamily="18" charset="0"/>
+                                    </a:rPr>
+                                    <m:t>2×</m:t>
+                                  </m:r>
+                                  <m:r>
+                                    <a:rPr lang="en-GB" sz="2000" b="0" i="1" smtClean="0">
+                                      <a:latin typeface="Cambria Math" panose="02040503050406030204" pitchFamily="18" charset="0"/>
+                                      <a:ea typeface="Cambria Math" panose="02040503050406030204" pitchFamily="18" charset="0"/>
+                                    </a:rPr>
+                                    <m:t>𝑝𝑟𝑒𝑐𝑖𝑠𝑖𝑜𝑛</m:t>
+                                  </m:r>
+                                  <m:r>
+                                    <a:rPr lang="en-GB" sz="2000" b="0" i="1" smtClean="0">
+                                      <a:latin typeface="Cambria Math" panose="02040503050406030204" pitchFamily="18" charset="0"/>
+                                      <a:ea typeface="Cambria Math" panose="02040503050406030204" pitchFamily="18" charset="0"/>
+                                    </a:rPr>
+                                    <m:t>×</m:t>
+                                  </m:r>
+                                  <m:r>
+                                    <a:rPr lang="en-GB" sz="2000" b="0" i="1" smtClean="0">
+                                      <a:latin typeface="Cambria Math" panose="02040503050406030204" pitchFamily="18" charset="0"/>
+                                      <a:ea typeface="Cambria Math" panose="02040503050406030204" pitchFamily="18" charset="0"/>
+                                    </a:rPr>
+                                    <m:t>𝑟𝑒𝑐𝑎𝑙𝑙</m:t>
+                                  </m:r>
+                                </m:num>
+                                <m:den>
+                                  <m:r>
+                                    <a:rPr lang="en-GB" sz="2000" b="0" i="1" smtClean="0">
+                                      <a:latin typeface="Cambria Math" panose="02040503050406030204" pitchFamily="18" charset="0"/>
+                                      <a:ea typeface="Cambria Math" panose="02040503050406030204" pitchFamily="18" charset="0"/>
+                                    </a:rPr>
+                                    <m:t>𝑝𝑟𝑒𝑐𝑖𝑠𝑖𝑜𝑛</m:t>
+                                  </m:r>
+                                  <m:r>
+                                    <a:rPr lang="en-GB" sz="2000" b="0" i="1" smtClean="0">
+                                      <a:latin typeface="Cambria Math" panose="02040503050406030204" pitchFamily="18" charset="0"/>
+                                      <a:ea typeface="Cambria Math" panose="02040503050406030204" pitchFamily="18" charset="0"/>
+                                    </a:rPr>
+                                    <m:t>+</m:t>
+                                  </m:r>
+                                  <m:r>
+                                    <a:rPr lang="en-GB" sz="2000" b="0" i="1" smtClean="0">
+                                      <a:latin typeface="Cambria Math" panose="02040503050406030204" pitchFamily="18" charset="0"/>
+                                      <a:ea typeface="Cambria Math" panose="02040503050406030204" pitchFamily="18" charset="0"/>
+                                    </a:rPr>
+                                    <m:t>𝑟𝑒𝑐𝑎𝑙𝑙</m:t>
+                                  </m:r>
+                                </m:den>
+                              </m:f>
                               <m:r>
                                 <a:rPr lang="en-GB" sz="2000" b="0" i="1" smtClean="0">
                                   <a:latin typeface="Cambria Math" panose="02040503050406030204" pitchFamily="18" charset="0"/>
                                   <a:ea typeface="Cambria Math" panose="02040503050406030204" pitchFamily="18" charset="0"/>
                                 </a:rPr>
-                                <m:t>|</m:t>
+                                <m:t>)/</m:t>
                               </m:r>
+                              <m:nary>
+                                <m:naryPr>
+                                  <m:chr m:val="∑"/>
+                                  <m:supHide m:val="on"/>
+                                  <m:ctrlPr>
+                                    <a:rPr lang="en-GB" sz="2000" b="0" i="1" smtClean="0">
+                                      <a:latin typeface="Cambria Math" panose="02040503050406030204" pitchFamily="18" charset="0"/>
+                                      <a:ea typeface="Cambria Math" panose="02040503050406030204" pitchFamily="18" charset="0"/>
+                                    </a:rPr>
+                                  </m:ctrlPr>
+                                </m:naryPr>
+                                <m:sub>
+                                  <m:r>
+                                    <m:rPr>
+                                      <m:brk m:alnAt="7"/>
+                                    </m:rPr>
+                                    <a:rPr lang="en-GB" sz="2000" b="0" i="1" smtClean="0">
+                                      <a:latin typeface="Cambria Math" panose="02040503050406030204" pitchFamily="18" charset="0"/>
+                                      <a:ea typeface="Cambria Math" panose="02040503050406030204" pitchFamily="18" charset="0"/>
+                                    </a:rPr>
+                                    <m:t>𝑐</m:t>
+                                  </m:r>
+                                  <m:r>
+                                    <a:rPr lang="en-GB" sz="2000" b="0" i="1" smtClean="0">
+                                      <a:latin typeface="Cambria Math" panose="02040503050406030204" pitchFamily="18" charset="0"/>
+                                      <a:ea typeface="Cambria Math" panose="02040503050406030204" pitchFamily="18" charset="0"/>
+                                    </a:rPr>
+                                    <m:t>∈</m:t>
+                                  </m:r>
+                                  <m:r>
+                                    <a:rPr lang="en-GB" sz="2000" b="0" i="1" smtClean="0">
+                                      <a:latin typeface="Cambria Math" panose="02040503050406030204" pitchFamily="18" charset="0"/>
+                                      <a:ea typeface="Cambria Math" panose="02040503050406030204" pitchFamily="18" charset="0"/>
+                                    </a:rPr>
+                                    <m:t>𝐶</m:t>
+                                  </m:r>
+                                </m:sub>
+                                <m:sup/>
+                                <m:e>
+                                  <m:r>
+                                    <a:rPr lang="en-GB" sz="2000" b="0" i="1" smtClean="0">
+                                      <a:latin typeface="Cambria Math" panose="02040503050406030204" pitchFamily="18" charset="0"/>
+                                      <a:ea typeface="Cambria Math" panose="02040503050406030204" pitchFamily="18" charset="0"/>
+                                    </a:rPr>
+                                    <m:t>|</m:t>
+                                  </m:r>
+                                  <m:r>
+                                    <a:rPr lang="en-GB" sz="2000" b="0" i="1" smtClean="0">
+                                      <a:latin typeface="Cambria Math" panose="02040503050406030204" pitchFamily="18" charset="0"/>
+                                      <a:ea typeface="Cambria Math" panose="02040503050406030204" pitchFamily="18" charset="0"/>
+                                    </a:rPr>
+                                    <m:t>𝐶</m:t>
+                                  </m:r>
+                                  <m:r>
+                                    <a:rPr lang="en-GB" sz="2000" b="0" i="1" smtClean="0">
+                                      <a:latin typeface="Cambria Math" panose="02040503050406030204" pitchFamily="18" charset="0"/>
+                                      <a:ea typeface="Cambria Math" panose="02040503050406030204" pitchFamily="18" charset="0"/>
+                                    </a:rPr>
+                                    <m:t>|</m:t>
+                                  </m:r>
+                                </m:e>
+                              </m:nary>
                             </m:e>
                           </m:nary>
-                        </m:e>
-                      </m:nary>
-                      <m:r>
-                        <a:rPr lang="en-GB" sz="2000" b="0" i="1" smtClean="0">
-                          <a:latin typeface="Cambria Math" panose="02040503050406030204" pitchFamily="18" charset="0"/>
-                        </a:rPr>
-                        <m:t> </m:t>
-                      </m:r>
-                    </m:oMath>
-                  </m:oMathPara>
-                </a14:m>
-                <a:endParaRPr lang="en-GB" sz="2000" dirty="0"/>
-              </a:p>
-            </p:txBody>
-          </p:sp>
-        </mc:Choice>
-        <mc:Fallback>
-          <p:sp>
-            <p:nvSpPr>
-              <p:cNvPr id="30" name="TextBox 29">
-                <a:extLst>
-                  <a:ext uri="{FF2B5EF4-FFF2-40B4-BE49-F238E27FC236}">
-                    <a16:creationId xmlns:a16="http://schemas.microsoft.com/office/drawing/2014/main" id="{0176BFC8-13F4-4CB7-9752-140161DD25FF}"/>
-                  </a:ext>
-                </a:extLst>
-              </p:cNvPr>
-              <p:cNvSpPr txBox="1">
-                <a:spLocks noRot="1" noChangeAspect="1" noMove="1" noResize="1" noEditPoints="1" noAdjustHandles="1" noChangeArrowheads="1" noChangeShapeType="1" noTextEdit="1"/>
-              </p:cNvSpPr>
-              <p:nvPr/>
-            </p:nvSpPr>
-            <p:spPr>
-              <a:xfrm>
-                <a:off x="1172655" y="15145756"/>
-                <a:ext cx="7309116" cy="747320"/>
-              </a:xfrm>
-              <a:prstGeom prst="rect">
-                <a:avLst/>
-              </a:prstGeom>
-              <a:blipFill>
-                <a:blip r:embed="rId15"/>
-                <a:stretch>
-                  <a:fillRect/>
-                </a:stretch>
-              </a:blipFill>
-            </p:spPr>
-            <p:txBody>
-              <a:bodyPr/>
-              <a:lstStyle/>
-              <a:p>
-                <a:r>
-                  <a:rPr lang="en-GB">
-                    <a:noFill/>
-                  </a:rPr>
-                  <a:t> </a:t>
-                </a:r>
-              </a:p>
-            </p:txBody>
-          </p:sp>
-        </mc:Fallback>
-      </mc:AlternateContent>
+                          <m:r>
+                            <a:rPr lang="en-GB" sz="2000" b="0" i="1" smtClean="0">
+                              <a:latin typeface="Cambria Math" panose="02040503050406030204" pitchFamily="18" charset="0"/>
+                            </a:rPr>
+                            <m:t> </m:t>
+                          </m:r>
+                        </m:oMath>
+                      </m:oMathPara>
+                    </a14:m>
+                    <a:endParaRPr lang="en-GB" sz="2000" dirty="0"/>
+                  </a:p>
+                </p:txBody>
+              </p:sp>
+            </mc:Choice>
+            <mc:Fallback>
+              <p:sp>
+                <p:nvSpPr>
+                  <p:cNvPr id="30" name="TextBox 29">
+                    <a:extLst>
+                      <a:ext uri="{FF2B5EF4-FFF2-40B4-BE49-F238E27FC236}">
+                        <a16:creationId xmlns:a16="http://schemas.microsoft.com/office/drawing/2014/main" id="{0176BFC8-13F4-4CB7-9752-140161DD25FF}"/>
+                      </a:ext>
+                    </a:extLst>
+                  </p:cNvPr>
+                  <p:cNvSpPr txBox="1">
+                    <a:spLocks noRot="1" noChangeAspect="1" noMove="1" noResize="1" noEditPoints="1" noAdjustHandles="1" noChangeArrowheads="1" noChangeShapeType="1" noTextEdit="1"/>
+                  </p:cNvSpPr>
+                  <p:nvPr/>
+                </p:nvSpPr>
+                <p:spPr>
+                  <a:xfrm>
+                    <a:off x="762044" y="13548616"/>
+                    <a:ext cx="7309116" cy="747320"/>
+                  </a:xfrm>
+                  <a:prstGeom prst="rect">
+                    <a:avLst/>
+                  </a:prstGeom>
+                  <a:blipFill>
+                    <a:blip r:embed="rId14"/>
+                    <a:stretch>
+                      <a:fillRect/>
+                    </a:stretch>
+                  </a:blipFill>
+                </p:spPr>
+                <p:txBody>
+                  <a:bodyPr/>
+                  <a:lstStyle/>
+                  <a:p>
+                    <a:r>
+                      <a:rPr lang="en-GB">
+                        <a:noFill/>
+                      </a:rPr>
+                      <a:t> </a:t>
+                    </a:r>
+                  </a:p>
+                </p:txBody>
+              </p:sp>
+            </mc:Fallback>
+          </mc:AlternateContent>
+        </p:grpSp>
+        <p:sp>
+          <p:nvSpPr>
+            <p:cNvPr id="46" name="TextBox 45">
+              <a:extLst>
+                <a:ext uri="{FF2B5EF4-FFF2-40B4-BE49-F238E27FC236}">
+                  <a16:creationId xmlns:a16="http://schemas.microsoft.com/office/drawing/2014/main" id="{CCFCE45D-D1A5-4C22-90BB-F83EA12CF9BF}"/>
+                </a:ext>
+              </a:extLst>
+            </p:cNvPr>
+            <p:cNvSpPr txBox="1"/>
+            <p:nvPr/>
+          </p:nvSpPr>
+          <p:spPr>
+            <a:xfrm>
+              <a:off x="772742" y="14149784"/>
+              <a:ext cx="2371113" cy="1323439"/>
+            </a:xfrm>
+            <a:prstGeom prst="rect">
+              <a:avLst/>
+            </a:prstGeom>
+            <a:noFill/>
+          </p:spPr>
+          <p:txBody>
+            <a:bodyPr wrap="square" rtlCol="0">
+              <a:spAutoFit/>
+            </a:bodyPr>
+            <a:lstStyle/>
+            <a:p>
+              <a:r>
+                <a:rPr lang="en-GB" sz="2000" dirty="0"/>
+                <a:t>F1 metric is result of an internal 3 fold cross-validation (k=3) . </a:t>
+              </a:r>
+            </a:p>
+          </p:txBody>
+        </p:sp>
+      </p:grpSp>
+      <p:sp>
+        <p:nvSpPr>
+          <p:cNvPr id="48" name="TextBox 47">
+            <a:extLst>
+              <a:ext uri="{FF2B5EF4-FFF2-40B4-BE49-F238E27FC236}">
+                <a16:creationId xmlns:a16="http://schemas.microsoft.com/office/drawing/2014/main" id="{FB66A6BB-3B62-4856-A79F-C7687717B983}"/>
+              </a:ext>
+            </a:extLst>
+          </p:cNvPr>
+          <p:cNvSpPr txBox="1"/>
+          <p:nvPr/>
+        </p:nvSpPr>
+        <p:spPr>
+          <a:xfrm>
+            <a:off x="274047" y="16679058"/>
+            <a:ext cx="3120936" cy="830997"/>
+          </a:xfrm>
+          <a:prstGeom prst="rect">
+            <a:avLst/>
+          </a:prstGeom>
+          <a:noFill/>
+        </p:spPr>
+        <p:txBody>
+          <a:bodyPr wrap="square" rtlCol="0">
+            <a:spAutoFit/>
+          </a:bodyPr>
+          <a:lstStyle/>
+          <a:p>
+            <a:r>
+              <a:rPr lang="en-GB" sz="2400" dirty="0"/>
+              <a:t>Elitist NSGA-II</a:t>
+            </a:r>
+            <a:br>
+              <a:rPr lang="en-GB" sz="2400" dirty="0"/>
+            </a:br>
+            <a:r>
+              <a:rPr lang="en-GB" sz="2400" dirty="0"/>
+              <a:t>with </a:t>
+            </a:r>
+            <a:r>
+              <a:rPr lang="el-GR" sz="2400" dirty="0"/>
+              <a:t>μ</a:t>
+            </a:r>
+            <a:r>
+              <a:rPr lang="en-GB" sz="2400" dirty="0"/>
+              <a:t>+</a:t>
+            </a:r>
+            <a:r>
+              <a:rPr lang="el-GR" sz="2400" dirty="0"/>
+              <a:t> λ</a:t>
+            </a:r>
+            <a:r>
+              <a:rPr lang="en-GB" sz="2400" dirty="0"/>
+              <a:t> (|</a:t>
+            </a:r>
+            <a:r>
+              <a:rPr lang="el-GR" sz="2400" dirty="0"/>
+              <a:t>μ</a:t>
+            </a:r>
+            <a:r>
+              <a:rPr lang="en-GB" sz="2400" dirty="0"/>
+              <a:t>|=|</a:t>
+            </a:r>
+            <a:r>
+              <a:rPr lang="el-GR" sz="2400" dirty="0"/>
+              <a:t>λ</a:t>
+            </a:r>
+            <a:r>
+              <a:rPr lang="en-GB" sz="2400" dirty="0"/>
+              <a:t>|)</a:t>
+            </a:r>
+          </a:p>
+        </p:txBody>
+      </p:sp>
+      <p:cxnSp>
+        <p:nvCxnSpPr>
+          <p:cNvPr id="52" name="Straight Arrow Connector 51">
+            <a:extLst>
+              <a:ext uri="{FF2B5EF4-FFF2-40B4-BE49-F238E27FC236}">
+                <a16:creationId xmlns:a16="http://schemas.microsoft.com/office/drawing/2014/main" id="{E5F585F5-F936-4D25-B50A-E06C38939F0F}"/>
+              </a:ext>
+            </a:extLst>
+          </p:cNvPr>
+          <p:cNvCxnSpPr>
+            <a:cxnSpLocks/>
+          </p:cNvCxnSpPr>
+          <p:nvPr/>
+        </p:nvCxnSpPr>
+        <p:spPr>
+          <a:xfrm>
+            <a:off x="1073835" y="17465615"/>
+            <a:ext cx="522319" cy="1680534"/>
+          </a:xfrm>
+          <a:prstGeom prst="straightConnector1">
+            <a:avLst/>
+          </a:prstGeom>
+          <a:ln>
+            <a:solidFill>
+              <a:schemeClr val="tx1"/>
+            </a:solidFill>
+            <a:tailEnd type="triangle"/>
+          </a:ln>
+        </p:spPr>
+        <p:style>
+          <a:lnRef idx="1">
+            <a:schemeClr val="accent1"/>
+          </a:lnRef>
+          <a:fillRef idx="0">
+            <a:schemeClr val="accent1"/>
+          </a:fillRef>
+          <a:effectRef idx="0">
+            <a:schemeClr val="accent1"/>
+          </a:effectRef>
+          <a:fontRef idx="minor">
+            <a:schemeClr val="tx1"/>
+          </a:fontRef>
+        </p:style>
+      </p:cxnSp>
+      <p:cxnSp>
+        <p:nvCxnSpPr>
+          <p:cNvPr id="58" name="Straight Arrow Connector 57">
+            <a:extLst>
+              <a:ext uri="{FF2B5EF4-FFF2-40B4-BE49-F238E27FC236}">
+                <a16:creationId xmlns:a16="http://schemas.microsoft.com/office/drawing/2014/main" id="{A19D8E4A-710D-429A-9A74-396247CB582B}"/>
+              </a:ext>
+            </a:extLst>
+          </p:cNvPr>
+          <p:cNvCxnSpPr>
+            <a:cxnSpLocks/>
+          </p:cNvCxnSpPr>
+          <p:nvPr/>
+        </p:nvCxnSpPr>
+        <p:spPr>
+          <a:xfrm>
+            <a:off x="1470072" y="17390144"/>
+            <a:ext cx="126082" cy="1129622"/>
+          </a:xfrm>
+          <a:prstGeom prst="straightConnector1">
+            <a:avLst/>
+          </a:prstGeom>
+          <a:ln>
+            <a:solidFill>
+              <a:schemeClr val="tx1"/>
+            </a:solidFill>
+            <a:tailEnd type="triangle"/>
+          </a:ln>
+        </p:spPr>
+        <p:style>
+          <a:lnRef idx="1">
+            <a:schemeClr val="accent1"/>
+          </a:lnRef>
+          <a:fillRef idx="0">
+            <a:schemeClr val="accent1"/>
+          </a:fillRef>
+          <a:effectRef idx="0">
+            <a:schemeClr val="accent1"/>
+          </a:effectRef>
+          <a:fontRef idx="minor">
+            <a:schemeClr val="tx1"/>
+          </a:fontRef>
+        </p:style>
+      </p:cxnSp>
+      <p:sp>
+        <p:nvSpPr>
+          <p:cNvPr id="65" name="TextBox 64">
+            <a:extLst>
+              <a:ext uri="{FF2B5EF4-FFF2-40B4-BE49-F238E27FC236}">
+                <a16:creationId xmlns:a16="http://schemas.microsoft.com/office/drawing/2014/main" id="{9865FD7D-806A-40E6-9D7E-4E528F5CBC05}"/>
+              </a:ext>
+            </a:extLst>
+          </p:cNvPr>
+          <p:cNvSpPr txBox="1"/>
+          <p:nvPr/>
+        </p:nvSpPr>
+        <p:spPr>
+          <a:xfrm>
+            <a:off x="634068" y="14293800"/>
+            <a:ext cx="7718400" cy="1203475"/>
+          </a:xfrm>
+          <a:prstGeom prst="rect">
+            <a:avLst/>
+          </a:prstGeom>
+          <a:noFill/>
+        </p:spPr>
+        <p:txBody>
+          <a:bodyPr wrap="square" rtlCol="0">
+            <a:noAutofit/>
+          </a:bodyPr>
+          <a:lstStyle/>
+          <a:p>
+            <a:r>
+              <a:rPr lang="en-GB" sz="2400" dirty="0"/>
+              <a:t>We use subtrees to construct features as mathematical expressions, these implicit features allow our trees to learn simpler rules.</a:t>
+            </a:r>
+          </a:p>
+          <a:p>
+            <a:endParaRPr lang="en-GB" sz="2000" dirty="0"/>
+          </a:p>
+        </p:txBody>
+      </p:sp>
+      <p:sp>
+        <p:nvSpPr>
+          <p:cNvPr id="70" name="TextBox 69">
+            <a:extLst>
+              <a:ext uri="{FF2B5EF4-FFF2-40B4-BE49-F238E27FC236}">
+                <a16:creationId xmlns:a16="http://schemas.microsoft.com/office/drawing/2014/main" id="{A7BB08E5-F237-4A27-99C8-17787047B618}"/>
+              </a:ext>
+            </a:extLst>
+          </p:cNvPr>
+          <p:cNvSpPr txBox="1"/>
+          <p:nvPr/>
+        </p:nvSpPr>
+        <p:spPr>
+          <a:xfrm>
+            <a:off x="9225197" y="8965208"/>
+            <a:ext cx="5904000" cy="1277124"/>
+          </a:xfrm>
+          <a:prstGeom prst="rect">
+            <a:avLst/>
+          </a:prstGeom>
+          <a:noFill/>
+        </p:spPr>
+        <p:txBody>
+          <a:bodyPr wrap="square" rtlCol="0">
+            <a:noAutofit/>
+          </a:bodyPr>
+          <a:lstStyle/>
+          <a:p>
+            <a:r>
+              <a:rPr lang="en-GB" sz="2000" dirty="0"/>
+              <a:t>The reconstruction ability was an f1 measure result of a 10 fold cross-validation across averaged across all three black-box classifiers. For each model extraction method this was done for each dataset.</a:t>
+            </a:r>
+          </a:p>
+        </p:txBody>
+      </p:sp>
     </p:spTree>
     <p:custDataLst>
       <p:tags r:id="rId1"/>

</xml_diff>